<commit_message>
Chaine partielle acquisition vitesse
</commit_message>
<xml_diff>
--- a/Capsuleuse/ChaineFonctionnelleCapsuleuse.pptx
+++ b/Capsuleuse/ChaineFonctionnelleCapsuleuse.pptx
@@ -5,15 +5,16 @@
     <p:sldMasterId id="2147483648" r:id="rId1"/>
   </p:sldMasterIdLst>
   <p:notesMasterIdLst>
-    <p:notesMasterId r:id="rId8"/>
+    <p:notesMasterId r:id="rId9"/>
   </p:notesMasterIdLst>
   <p:sldIdLst>
     <p:sldId id="263" r:id="rId2"/>
     <p:sldId id="265" r:id="rId3"/>
     <p:sldId id="264" r:id="rId4"/>
-    <p:sldId id="258" r:id="rId5"/>
-    <p:sldId id="259" r:id="rId6"/>
-    <p:sldId id="260" r:id="rId7"/>
+    <p:sldId id="266" r:id="rId5"/>
+    <p:sldId id="258" r:id="rId6"/>
+    <p:sldId id="259" r:id="rId7"/>
+    <p:sldId id="260" r:id="rId8"/>
   </p:sldIdLst>
   <p:sldSz cx="9144000" cy="6858000" type="screen4x3"/>
   <p:notesSz cx="6858000" cy="9144000"/>
@@ -197,7 +198,7 @@
           <a:p>
             <a:fld id="{B74FA7BB-1A3F-4A67-8555-C00500105A10}" type="datetimeFigureOut">
               <a:rPr lang="fr-FR" smtClean="0"/>
-              <a:t>19/10/2014</a:t>
+              <a:t>06/01/2015</a:t>
             </a:fld>
             <a:endParaRPr lang="fr-FR"/>
           </a:p>
@@ -710,6 +711,87 @@
 </p:notes>
 </file>
 
+<file path=ppt/notesSlides/notesSlide4.xml><?xml version="1.0" encoding="utf-8"?>
+<p:notes xmlns:a="http://schemas.openxmlformats.org/drawingml/2006/main" xmlns:r="http://schemas.openxmlformats.org/officeDocument/2006/relationships" xmlns:p="http://schemas.openxmlformats.org/presentationml/2006/main">
+  <p:cSld>
+    <p:spTree>
+      <p:nvGrpSpPr>
+        <p:cNvPr id="1" name=""/>
+        <p:cNvGrpSpPr/>
+        <p:nvPr/>
+      </p:nvGrpSpPr>
+      <p:grpSpPr>
+        <a:xfrm>
+          <a:off x="0" y="0"/>
+          <a:ext cx="0" cy="0"/>
+          <a:chOff x="0" y="0"/>
+          <a:chExt cx="0" cy="0"/>
+        </a:xfrm>
+      </p:grpSpPr>
+      <p:sp>
+        <p:nvSpPr>
+          <p:cNvPr id="2" name="Espace réservé de l'image des diapositives 1"/>
+          <p:cNvSpPr>
+            <a:spLocks noGrp="1" noRot="1" noChangeAspect="1"/>
+          </p:cNvSpPr>
+          <p:nvPr>
+            <p:ph type="sldImg"/>
+          </p:nvPr>
+        </p:nvSpPr>
+        <p:spPr/>
+      </p:sp>
+      <p:sp>
+        <p:nvSpPr>
+          <p:cNvPr id="3" name="Espace réservé des commentaires 2"/>
+          <p:cNvSpPr>
+            <a:spLocks noGrp="1"/>
+          </p:cNvSpPr>
+          <p:nvPr>
+            <p:ph type="body" idx="1"/>
+          </p:nvPr>
+        </p:nvSpPr>
+        <p:spPr/>
+        <p:txBody>
+          <a:bodyPr>
+            <a:normAutofit/>
+          </a:bodyPr>
+          <a:lstStyle/>
+          <a:p>
+            <a:endParaRPr lang="fr-FR" dirty="0"/>
+          </a:p>
+        </p:txBody>
+      </p:sp>
+      <p:sp>
+        <p:nvSpPr>
+          <p:cNvPr id="4" name="Espace réservé du numéro de diapositive 3"/>
+          <p:cNvSpPr>
+            <a:spLocks noGrp="1"/>
+          </p:cNvSpPr>
+          <p:nvPr>
+            <p:ph type="sldNum" sz="quarter" idx="10"/>
+          </p:nvPr>
+        </p:nvSpPr>
+        <p:spPr/>
+        <p:txBody>
+          <a:bodyPr/>
+          <a:lstStyle/>
+          <a:p>
+            <a:fld id="{145E6FF7-9CB1-4061-B950-98AB253EA254}" type="slidenum">
+              <a:rPr lang="fr-FR" smtClean="0"/>
+              <a:t>4</a:t>
+            </a:fld>
+            <a:endParaRPr lang="fr-FR"/>
+          </a:p>
+        </p:txBody>
+      </p:sp>
+    </p:spTree>
+  </p:cSld>
+  <p:clrMapOvr>
+    <a:masterClrMapping/>
+  </p:clrMapOvr>
+</p:notes>
+</file>
+
 <file path=ppt/slideLayouts/slideLayout1.xml><?xml version="1.0" encoding="utf-8"?>
 <p:sldLayout xmlns:a="http://schemas.openxmlformats.org/drawingml/2006/main" xmlns:r="http://schemas.openxmlformats.org/officeDocument/2006/relationships" xmlns:p="http://schemas.openxmlformats.org/presentationml/2006/main" type="title" preserve="1">
   <p:cSld name="Diapositive de titre">
@@ -892,7 +974,7 @@
             <a:fld id="{AA309A6D-C09C-4548-B29A-6CF363A7E532}" type="datetimeFigureOut">
               <a:rPr lang="fr-FR" smtClean="0"/>
               <a:pPr/>
-              <a:t>19/10/2014</a:t>
+              <a:t>06/01/2015</a:t>
             </a:fld>
             <a:endParaRPr lang="fr-BE"/>
           </a:p>
@@ -1059,7 +1141,7 @@
             <a:fld id="{AA309A6D-C09C-4548-B29A-6CF363A7E532}" type="datetimeFigureOut">
               <a:rPr lang="fr-FR" smtClean="0"/>
               <a:pPr/>
-              <a:t>19/10/2014</a:t>
+              <a:t>06/01/2015</a:t>
             </a:fld>
             <a:endParaRPr lang="fr-BE"/>
           </a:p>
@@ -1236,7 +1318,7 @@
             <a:fld id="{AA309A6D-C09C-4548-B29A-6CF363A7E532}" type="datetimeFigureOut">
               <a:rPr lang="fr-FR" smtClean="0"/>
               <a:pPr/>
-              <a:t>19/10/2014</a:t>
+              <a:t>06/01/2015</a:t>
             </a:fld>
             <a:endParaRPr lang="fr-BE"/>
           </a:p>
@@ -1403,7 +1485,7 @@
             <a:fld id="{AA309A6D-C09C-4548-B29A-6CF363A7E532}" type="datetimeFigureOut">
               <a:rPr lang="fr-FR" smtClean="0"/>
               <a:pPr/>
-              <a:t>19/10/2014</a:t>
+              <a:t>06/01/2015</a:t>
             </a:fld>
             <a:endParaRPr lang="fr-BE"/>
           </a:p>
@@ -1646,7 +1728,7 @@
             <a:fld id="{AA309A6D-C09C-4548-B29A-6CF363A7E532}" type="datetimeFigureOut">
               <a:rPr lang="fr-FR" smtClean="0"/>
               <a:pPr/>
-              <a:t>19/10/2014</a:t>
+              <a:t>06/01/2015</a:t>
             </a:fld>
             <a:endParaRPr lang="fr-BE"/>
           </a:p>
@@ -1931,7 +2013,7 @@
             <a:fld id="{AA309A6D-C09C-4548-B29A-6CF363A7E532}" type="datetimeFigureOut">
               <a:rPr lang="fr-FR" smtClean="0"/>
               <a:pPr/>
-              <a:t>19/10/2014</a:t>
+              <a:t>06/01/2015</a:t>
             </a:fld>
             <a:endParaRPr lang="fr-BE"/>
           </a:p>
@@ -2350,7 +2432,7 @@
             <a:fld id="{AA309A6D-C09C-4548-B29A-6CF363A7E532}" type="datetimeFigureOut">
               <a:rPr lang="fr-FR" smtClean="0"/>
               <a:pPr/>
-              <a:t>19/10/2014</a:t>
+              <a:t>06/01/2015</a:t>
             </a:fld>
             <a:endParaRPr lang="fr-BE"/>
           </a:p>
@@ -2465,7 +2547,7 @@
             <a:fld id="{AA309A6D-C09C-4548-B29A-6CF363A7E532}" type="datetimeFigureOut">
               <a:rPr lang="fr-FR" smtClean="0"/>
               <a:pPr/>
-              <a:t>19/10/2014</a:t>
+              <a:t>06/01/2015</a:t>
             </a:fld>
             <a:endParaRPr lang="fr-BE"/>
           </a:p>
@@ -2557,7 +2639,7 @@
             <a:fld id="{AA309A6D-C09C-4548-B29A-6CF363A7E532}" type="datetimeFigureOut">
               <a:rPr lang="fr-FR" smtClean="0"/>
               <a:pPr/>
-              <a:t>19/10/2014</a:t>
+              <a:t>06/01/2015</a:t>
             </a:fld>
             <a:endParaRPr lang="fr-BE"/>
           </a:p>
@@ -2831,7 +2913,7 @@
             <a:fld id="{AA309A6D-C09C-4548-B29A-6CF363A7E532}" type="datetimeFigureOut">
               <a:rPr lang="fr-FR" smtClean="0"/>
               <a:pPr/>
-              <a:t>19/10/2014</a:t>
+              <a:t>06/01/2015</a:t>
             </a:fld>
             <a:endParaRPr lang="fr-BE"/>
           </a:p>
@@ -3081,7 +3163,7 @@
             <a:fld id="{AA309A6D-C09C-4548-B29A-6CF363A7E532}" type="datetimeFigureOut">
               <a:rPr lang="fr-FR" smtClean="0"/>
               <a:pPr/>
-              <a:t>19/10/2014</a:t>
+              <a:t>06/01/2015</a:t>
             </a:fld>
             <a:endParaRPr lang="fr-BE"/>
           </a:p>
@@ -3291,7 +3373,7 @@
             <a:fld id="{AA309A6D-C09C-4548-B29A-6CF363A7E532}" type="datetimeFigureOut">
               <a:rPr lang="fr-FR" smtClean="0"/>
               <a:pPr/>
-              <a:t>19/10/2014</a:t>
+              <a:t>06/01/2015</a:t>
             </a:fld>
             <a:endParaRPr lang="fr-BE"/>
           </a:p>
@@ -10787,6 +10869,1419 @@
         </p:nvSpPr>
         <p:spPr>
           <a:xfrm>
+            <a:off x="428596" y="2082690"/>
+            <a:ext cx="6286544" cy="2282414"/>
+          </a:xfrm>
+          <a:prstGeom prst="roundRect">
+            <a:avLst>
+              <a:gd name="adj" fmla="val 8149"/>
+            </a:avLst>
+          </a:prstGeom>
+          <a:solidFill>
+            <a:schemeClr val="accent2">
+              <a:lumMod val="20000"/>
+              <a:lumOff val="80000"/>
+            </a:schemeClr>
+          </a:solidFill>
+          <a:ln w="25400" cap="flat" cmpd="sng" algn="ctr">
+            <a:solidFill>
+              <a:srgbClr val="C0504D"/>
+            </a:solidFill>
+            <a:prstDash val="solid"/>
+          </a:ln>
+          <a:effectLst/>
+        </p:spPr>
+        <p:txBody>
+          <a:bodyPr rtlCol="0" anchor="b"/>
+          <a:lstStyle/>
+          <a:p>
+            <a:pPr marL="0" marR="0" lvl="0" indent="0" algn="ctr" defTabSz="914400" eaLnBrk="1" fontAlgn="auto" latinLnBrk="0" hangingPunct="1">
+              <a:lnSpc>
+                <a:spcPct val="100000"/>
+              </a:lnSpc>
+              <a:spcBef>
+                <a:spcPts val="0"/>
+              </a:spcBef>
+              <a:spcAft>
+                <a:spcPts val="0"/>
+              </a:spcAft>
+              <a:buClrTx/>
+              <a:buSzTx/>
+              <a:buFontTx/>
+              <a:buNone/>
+              <a:tabLst/>
+              <a:defRPr/>
+            </a:pPr>
+            <a:r>
+              <a:rPr kumimoji="0" lang="fr-FR" sz="1400" b="0" i="1" u="none" strike="noStrike" kern="0" cap="none" spc="0" normalizeH="0" baseline="0" noProof="0" dirty="0" smtClean="0">
+                <a:ln>
+                  <a:noFill/>
+                </a:ln>
+                <a:solidFill>
+                  <a:prstClr val="black"/>
+                </a:solidFill>
+                <a:effectLst/>
+                <a:uLnTx/>
+                <a:uFillTx/>
+                <a:latin typeface="Calibri"/>
+                <a:ea typeface="+mn-ea"/>
+                <a:cs typeface="+mn-cs"/>
+              </a:rPr>
+              <a:t>Chaîne </a:t>
+            </a:r>
+            <a:r>
+              <a:rPr kumimoji="0" lang="fr-FR" sz="1400" b="0" i="1" u="none" strike="noStrike" kern="0" cap="none" spc="0" normalizeH="0" baseline="0" noProof="0" dirty="0" smtClean="0">
+                <a:ln>
+                  <a:noFill/>
+                </a:ln>
+                <a:solidFill>
+                  <a:prstClr val="black"/>
+                </a:solidFill>
+                <a:effectLst/>
+                <a:uLnTx/>
+                <a:uFillTx/>
+                <a:latin typeface="Calibri"/>
+                <a:ea typeface="+mn-ea"/>
+                <a:cs typeface="+mn-cs"/>
+              </a:rPr>
+              <a:t>d’énergie partielle</a:t>
+            </a:r>
+            <a:endParaRPr kumimoji="0" lang="fr-FR" sz="1400" b="0" i="1" u="none" strike="noStrike" kern="0" cap="none" spc="0" normalizeH="0" baseline="0" noProof="0" dirty="0" smtClean="0">
+              <a:ln>
+                <a:noFill/>
+              </a:ln>
+              <a:solidFill>
+                <a:prstClr val="black"/>
+              </a:solidFill>
+              <a:effectLst/>
+              <a:uLnTx/>
+              <a:uFillTx/>
+              <a:latin typeface="Calibri"/>
+              <a:ea typeface="+mn-ea"/>
+              <a:cs typeface="+mn-cs"/>
+            </a:endParaRPr>
+          </a:p>
+        </p:txBody>
+      </p:sp>
+      <p:sp>
+        <p:nvSpPr>
+          <p:cNvPr id="58" name="Rectangle 57"/>
+          <p:cNvSpPr/>
+          <p:nvPr/>
+        </p:nvSpPr>
+        <p:spPr>
+          <a:xfrm>
+            <a:off x="5286380" y="2275053"/>
+            <a:ext cx="1071570" cy="793908"/>
+          </a:xfrm>
+          <a:prstGeom prst="rect">
+            <a:avLst/>
+          </a:prstGeom>
+          <a:solidFill>
+            <a:schemeClr val="accent2">
+              <a:lumMod val="40000"/>
+              <a:lumOff val="60000"/>
+            </a:schemeClr>
+          </a:solidFill>
+          <a:ln w="9525" cap="flat" cmpd="sng" algn="ctr">
+            <a:solidFill>
+              <a:srgbClr val="C0504D">
+                <a:shade val="95000"/>
+                <a:satMod val="105000"/>
+              </a:srgbClr>
+            </a:solidFill>
+            <a:prstDash val="solid"/>
+          </a:ln>
+          <a:effectLst>
+            <a:outerShdw blurRad="40000" dist="20000" dir="5400000" rotWithShape="0">
+              <a:srgbClr val="000000">
+                <a:alpha val="38000"/>
+              </a:srgbClr>
+            </a:outerShdw>
+          </a:effectLst>
+        </p:spPr>
+        <p:txBody>
+          <a:bodyPr rtlCol="0" anchor="t"/>
+          <a:lstStyle/>
+          <a:p>
+            <a:pPr marR="0" lvl="0" indent="0" algn="ctr" fontAlgn="auto">
+              <a:lnSpc>
+                <a:spcPct val="100000"/>
+              </a:lnSpc>
+              <a:spcBef>
+                <a:spcPts val="0"/>
+              </a:spcBef>
+              <a:spcAft>
+                <a:spcPts val="0"/>
+              </a:spcAft>
+              <a:buClrTx/>
+              <a:buSzTx/>
+              <a:buFontTx/>
+              <a:buNone/>
+              <a:tabLst/>
+              <a:defRPr/>
+            </a:pPr>
+            <a:r>
+              <a:rPr lang="fr-FR" sz="1200" b="1" kern="0" dirty="0" smtClean="0">
+                <a:solidFill>
+                  <a:prstClr val="black"/>
+                </a:solidFill>
+                <a:latin typeface="Calibri"/>
+              </a:rPr>
+              <a:t>AGIR</a:t>
+            </a:r>
+          </a:p>
+          <a:p>
+            <a:pPr marR="0" lvl="0" indent="0" algn="ctr" fontAlgn="auto">
+              <a:lnSpc>
+                <a:spcPct val="100000"/>
+              </a:lnSpc>
+              <a:spcBef>
+                <a:spcPts val="0"/>
+              </a:spcBef>
+              <a:spcAft>
+                <a:spcPts val="0"/>
+              </a:spcAft>
+              <a:buClrTx/>
+              <a:buSzTx/>
+              <a:buFontTx/>
+              <a:buNone/>
+              <a:tabLst/>
+              <a:defRPr/>
+            </a:pPr>
+            <a:endParaRPr lang="fr-FR" sz="1200" b="1" kern="0" dirty="0" smtClean="0">
+              <a:solidFill>
+                <a:prstClr val="black"/>
+              </a:solidFill>
+              <a:latin typeface="Calibri"/>
+            </a:endParaRPr>
+          </a:p>
+          <a:p>
+            <a:pPr marR="0" lvl="0" indent="0" algn="ctr" fontAlgn="auto">
+              <a:lnSpc>
+                <a:spcPct val="100000"/>
+              </a:lnSpc>
+              <a:spcBef>
+                <a:spcPts val="0"/>
+              </a:spcBef>
+              <a:spcAft>
+                <a:spcPts val="0"/>
+              </a:spcAft>
+              <a:buClrTx/>
+              <a:buSzTx/>
+              <a:buFontTx/>
+              <a:buNone/>
+              <a:tabLst/>
+              <a:defRPr/>
+            </a:pPr>
+            <a:r>
+              <a:rPr lang="fr-FR" sz="1200" kern="0" dirty="0" smtClean="0">
+                <a:solidFill>
+                  <a:prstClr val="black"/>
+                </a:solidFill>
+                <a:latin typeface="Calibri"/>
+              </a:rPr>
+              <a:t>Plateau de transfert</a:t>
+            </a:r>
+          </a:p>
+        </p:txBody>
+      </p:sp>
+      <p:sp>
+        <p:nvSpPr>
+          <p:cNvPr id="62" name="Rectangle à coins arrondis 61"/>
+          <p:cNvSpPr/>
+          <p:nvPr/>
+        </p:nvSpPr>
+        <p:spPr>
+          <a:xfrm>
+            <a:off x="428596" y="-99391"/>
+            <a:ext cx="6286545" cy="1918354"/>
+          </a:xfrm>
+          <a:prstGeom prst="roundRect">
+            <a:avLst>
+              <a:gd name="adj" fmla="val 4221"/>
+            </a:avLst>
+          </a:prstGeom>
+          <a:solidFill>
+            <a:schemeClr val="tx2">
+              <a:lumMod val="20000"/>
+              <a:lumOff val="80000"/>
+            </a:schemeClr>
+          </a:solidFill>
+          <a:ln w="25400" cap="flat" cmpd="sng" algn="ctr">
+            <a:solidFill>
+              <a:srgbClr val="4F81BD"/>
+            </a:solidFill>
+            <a:prstDash val="solid"/>
+          </a:ln>
+          <a:effectLst/>
+        </p:spPr>
+        <p:txBody>
+          <a:bodyPr rtlCol="0" anchor="t"/>
+          <a:lstStyle/>
+          <a:p>
+            <a:pPr marL="0" marR="0" lvl="0" indent="0" algn="ctr" defTabSz="914400" eaLnBrk="1" fontAlgn="auto" latinLnBrk="0" hangingPunct="1">
+              <a:lnSpc>
+                <a:spcPct val="100000"/>
+              </a:lnSpc>
+              <a:spcBef>
+                <a:spcPts val="0"/>
+              </a:spcBef>
+              <a:spcAft>
+                <a:spcPts val="0"/>
+              </a:spcAft>
+              <a:buClrTx/>
+              <a:buSzTx/>
+              <a:buFontTx/>
+              <a:buNone/>
+              <a:tabLst/>
+              <a:defRPr/>
+            </a:pPr>
+            <a:r>
+              <a:rPr kumimoji="0" lang="fr-FR" sz="1400" b="0" i="1" u="none" strike="noStrike" kern="0" cap="none" spc="0" normalizeH="0" baseline="0" noProof="0" dirty="0" smtClean="0">
+                <a:ln>
+                  <a:noFill/>
+                </a:ln>
+                <a:solidFill>
+                  <a:prstClr val="black"/>
+                </a:solidFill>
+                <a:effectLst/>
+                <a:uLnTx/>
+                <a:uFillTx/>
+                <a:latin typeface="Calibri"/>
+                <a:ea typeface="+mn-ea"/>
+                <a:cs typeface="+mn-cs"/>
+              </a:rPr>
+              <a:t>Chaîne </a:t>
+            </a:r>
+            <a:r>
+              <a:rPr kumimoji="0" lang="fr-FR" sz="1400" b="0" i="1" u="none" strike="noStrike" kern="0" cap="none" spc="0" normalizeH="0" baseline="0" noProof="0" dirty="0" smtClean="0">
+                <a:ln>
+                  <a:noFill/>
+                </a:ln>
+                <a:solidFill>
+                  <a:prstClr val="black"/>
+                </a:solidFill>
+                <a:effectLst/>
+                <a:uLnTx/>
+                <a:uFillTx/>
+                <a:latin typeface="Calibri"/>
+                <a:ea typeface="+mn-ea"/>
+                <a:cs typeface="+mn-cs"/>
+              </a:rPr>
+              <a:t>d’information partielle</a:t>
+            </a:r>
+            <a:endParaRPr kumimoji="0" lang="fr-FR" sz="1400" b="0" i="1" u="none" strike="noStrike" kern="0" cap="none" spc="0" normalizeH="0" baseline="0" noProof="0" dirty="0" smtClean="0">
+              <a:ln>
+                <a:noFill/>
+              </a:ln>
+              <a:solidFill>
+                <a:prstClr val="black"/>
+              </a:solidFill>
+              <a:effectLst/>
+              <a:uLnTx/>
+              <a:uFillTx/>
+              <a:latin typeface="Calibri"/>
+              <a:ea typeface="+mn-ea"/>
+              <a:cs typeface="+mn-cs"/>
+            </a:endParaRPr>
+          </a:p>
+        </p:txBody>
+      </p:sp>
+      <p:sp>
+        <p:nvSpPr>
+          <p:cNvPr id="64" name="Rectangle 63"/>
+          <p:cNvSpPr/>
+          <p:nvPr/>
+        </p:nvSpPr>
+        <p:spPr>
+          <a:xfrm>
+            <a:off x="725588" y="285728"/>
+            <a:ext cx="1440000" cy="576000"/>
+          </a:xfrm>
+          <a:prstGeom prst="rect">
+            <a:avLst/>
+          </a:prstGeom>
+          <a:solidFill>
+            <a:schemeClr val="tx2">
+              <a:lumMod val="40000"/>
+              <a:lumOff val="60000"/>
+            </a:schemeClr>
+          </a:solidFill>
+          <a:ln w="9525" cap="flat" cmpd="sng" algn="ctr">
+            <a:solidFill>
+              <a:srgbClr val="4F81BD">
+                <a:shade val="95000"/>
+                <a:satMod val="105000"/>
+              </a:srgbClr>
+            </a:solidFill>
+            <a:prstDash val="solid"/>
+          </a:ln>
+          <a:effectLst>
+            <a:outerShdw blurRad="40000" dist="20000" dir="5400000" rotWithShape="0">
+              <a:srgbClr val="000000">
+                <a:alpha val="38000"/>
+              </a:srgbClr>
+            </a:outerShdw>
+          </a:effectLst>
+        </p:spPr>
+        <p:txBody>
+          <a:bodyPr rtlCol="0" anchor="t"/>
+          <a:lstStyle/>
+          <a:p>
+            <a:pPr marL="0" marR="0" lvl="0" indent="0" algn="ctr" defTabSz="914400" eaLnBrk="1" fontAlgn="auto" latinLnBrk="0" hangingPunct="1">
+              <a:lnSpc>
+                <a:spcPct val="100000"/>
+              </a:lnSpc>
+              <a:spcBef>
+                <a:spcPts val="0"/>
+              </a:spcBef>
+              <a:spcAft>
+                <a:spcPts val="0"/>
+              </a:spcAft>
+              <a:buClrTx/>
+              <a:buSzTx/>
+              <a:buFontTx/>
+              <a:buNone/>
+              <a:tabLst/>
+              <a:defRPr/>
+            </a:pPr>
+            <a:r>
+              <a:rPr kumimoji="0" lang="fr-FR" sz="1200" b="1" i="0" u="none" strike="noStrike" kern="0" cap="none" spc="0" normalizeH="0" baseline="0" noProof="0" dirty="0" smtClean="0">
+                <a:ln>
+                  <a:noFill/>
+                </a:ln>
+                <a:solidFill>
+                  <a:prstClr val="black"/>
+                </a:solidFill>
+                <a:effectLst/>
+                <a:uLnTx/>
+                <a:uFillTx/>
+                <a:latin typeface="Calibri"/>
+                <a:ea typeface="+mn-ea"/>
+                <a:cs typeface="+mn-cs"/>
+              </a:rPr>
+              <a:t>ACQUERIR</a:t>
+            </a:r>
+          </a:p>
+          <a:p>
+            <a:pPr marL="0" marR="0" lvl="0" indent="0" algn="ctr" defTabSz="914400" eaLnBrk="1" fontAlgn="auto" latinLnBrk="0" hangingPunct="1">
+              <a:lnSpc>
+                <a:spcPct val="100000"/>
+              </a:lnSpc>
+              <a:spcBef>
+                <a:spcPts val="0"/>
+              </a:spcBef>
+              <a:spcAft>
+                <a:spcPts val="0"/>
+              </a:spcAft>
+              <a:buClrTx/>
+              <a:buSzTx/>
+              <a:buFontTx/>
+              <a:buNone/>
+              <a:tabLst/>
+              <a:defRPr/>
+            </a:pPr>
+            <a:r>
+              <a:rPr kumimoji="0" lang="fr-FR" sz="1200" i="0" u="none" strike="noStrike" kern="0" cap="none" spc="0" normalizeH="0" baseline="0" noProof="0" dirty="0" smtClean="0">
+                <a:ln>
+                  <a:noFill/>
+                </a:ln>
+                <a:solidFill>
+                  <a:prstClr val="black"/>
+                </a:solidFill>
+                <a:effectLst/>
+                <a:uLnTx/>
+                <a:uFillTx/>
+                <a:latin typeface="Calibri"/>
+                <a:ea typeface="+mn-ea"/>
+                <a:cs typeface="+mn-cs"/>
+              </a:rPr>
+              <a:t>Génératrices</a:t>
+            </a:r>
+            <a:r>
+              <a:rPr kumimoji="0" lang="fr-FR" sz="1200" i="0" u="none" strike="noStrike" kern="0" cap="none" spc="0" normalizeH="0" noProof="0" dirty="0" smtClean="0">
+                <a:ln>
+                  <a:noFill/>
+                </a:ln>
+                <a:solidFill>
+                  <a:prstClr val="black"/>
+                </a:solidFill>
+                <a:effectLst/>
+                <a:uLnTx/>
+                <a:uFillTx/>
+                <a:latin typeface="Calibri"/>
+                <a:ea typeface="+mn-ea"/>
+                <a:cs typeface="+mn-cs"/>
+              </a:rPr>
+              <a:t> </a:t>
+            </a:r>
+            <a:r>
+              <a:rPr kumimoji="0" lang="fr-FR" sz="1200" i="0" u="none" strike="noStrike" kern="0" cap="none" spc="0" normalizeH="0" noProof="0" dirty="0" err="1" smtClean="0">
+                <a:ln>
+                  <a:noFill/>
+                </a:ln>
+                <a:solidFill>
+                  <a:prstClr val="black"/>
+                </a:solidFill>
+                <a:effectLst/>
+                <a:uLnTx/>
+                <a:uFillTx/>
+                <a:latin typeface="Calibri"/>
+                <a:ea typeface="+mn-ea"/>
+                <a:cs typeface="+mn-cs"/>
+              </a:rPr>
+              <a:t>tachymétriques</a:t>
+            </a:r>
+            <a:endParaRPr kumimoji="0" lang="fr-FR" sz="1200" i="0" u="none" strike="noStrike" kern="0" cap="none" spc="0" normalizeH="0" baseline="0" noProof="0" dirty="0" smtClean="0">
+              <a:ln>
+                <a:noFill/>
+              </a:ln>
+              <a:solidFill>
+                <a:prstClr val="black"/>
+              </a:solidFill>
+              <a:effectLst/>
+              <a:uLnTx/>
+              <a:uFillTx/>
+              <a:latin typeface="Calibri"/>
+              <a:ea typeface="+mn-ea"/>
+              <a:cs typeface="+mn-cs"/>
+            </a:endParaRPr>
+          </a:p>
+          <a:p>
+            <a:pPr marL="0" marR="0" lvl="0" indent="0" algn="ctr" defTabSz="914400" eaLnBrk="1" fontAlgn="auto" latinLnBrk="0" hangingPunct="1">
+              <a:lnSpc>
+                <a:spcPct val="100000"/>
+              </a:lnSpc>
+              <a:spcBef>
+                <a:spcPts val="0"/>
+              </a:spcBef>
+              <a:spcAft>
+                <a:spcPts val="0"/>
+              </a:spcAft>
+              <a:buClrTx/>
+              <a:buSzTx/>
+              <a:buFontTx/>
+              <a:buNone/>
+              <a:tabLst/>
+              <a:defRPr/>
+            </a:pPr>
+            <a:endParaRPr kumimoji="0" lang="fr-FR" sz="1200" b="0" i="0" u="none" strike="noStrike" kern="0" cap="none" spc="0" normalizeH="0" baseline="0" noProof="0" dirty="0" smtClean="0">
+              <a:ln>
+                <a:noFill/>
+              </a:ln>
+              <a:solidFill>
+                <a:prstClr val="black"/>
+              </a:solidFill>
+              <a:effectLst/>
+              <a:uLnTx/>
+              <a:uFillTx/>
+              <a:latin typeface="Calibri"/>
+              <a:ea typeface="+mn-ea"/>
+              <a:cs typeface="+mn-cs"/>
+            </a:endParaRPr>
+          </a:p>
+        </p:txBody>
+      </p:sp>
+      <p:cxnSp>
+        <p:nvCxnSpPr>
+          <p:cNvPr id="75" name="Connecteur droit avec flèche 74"/>
+          <p:cNvCxnSpPr/>
+          <p:nvPr/>
+        </p:nvCxnSpPr>
+        <p:spPr>
+          <a:xfrm>
+            <a:off x="357158" y="692696"/>
+            <a:ext cx="382961" cy="0"/>
+          </a:xfrm>
+          <a:prstGeom prst="straightConnector1">
+            <a:avLst/>
+          </a:prstGeom>
+          <a:solidFill>
+            <a:schemeClr val="accent1">
+              <a:lumMod val="20000"/>
+              <a:lumOff val="80000"/>
+            </a:schemeClr>
+          </a:solidFill>
+          <a:ln w="28575" cap="flat" cmpd="sng" algn="ctr">
+            <a:solidFill>
+              <a:srgbClr val="4F81BD">
+                <a:shade val="95000"/>
+                <a:satMod val="105000"/>
+              </a:srgbClr>
+            </a:solidFill>
+            <a:prstDash val="solid"/>
+            <a:tailEnd type="arrow"/>
+          </a:ln>
+          <a:effectLst/>
+        </p:spPr>
+      </p:cxnSp>
+      <p:sp>
+        <p:nvSpPr>
+          <p:cNvPr id="77" name="ZoneTexte 76"/>
+          <p:cNvSpPr txBox="1"/>
+          <p:nvPr/>
+        </p:nvSpPr>
+        <p:spPr>
+          <a:xfrm>
+            <a:off x="4836403" y="348894"/>
+            <a:ext cx="1884488" cy="461665"/>
+          </a:xfrm>
+          <a:prstGeom prst="rect">
+            <a:avLst/>
+          </a:prstGeom>
+          <a:noFill/>
+        </p:spPr>
+        <p:txBody>
+          <a:bodyPr wrap="square" rtlCol="0">
+            <a:spAutoFit/>
+          </a:bodyPr>
+          <a:lstStyle/>
+          <a:p>
+            <a:r>
+              <a:rPr lang="fr-FR" sz="1200" b="1" i="1" dirty="0" smtClean="0">
+                <a:solidFill>
+                  <a:schemeClr val="tx2"/>
+                </a:solidFill>
+              </a:rPr>
+              <a:t>Informations destinées  au PC</a:t>
+            </a:r>
+            <a:endParaRPr lang="fr-FR" sz="1200" b="1" i="1" dirty="0">
+              <a:solidFill>
+                <a:schemeClr val="tx2"/>
+              </a:solidFill>
+            </a:endParaRPr>
+          </a:p>
+        </p:txBody>
+      </p:sp>
+      <p:cxnSp>
+        <p:nvCxnSpPr>
+          <p:cNvPr id="126" name="Connecteur droit avec flèche 125"/>
+          <p:cNvCxnSpPr/>
+          <p:nvPr/>
+        </p:nvCxnSpPr>
+        <p:spPr>
+          <a:xfrm flipV="1">
+            <a:off x="357158" y="699530"/>
+            <a:ext cx="0" cy="1649350"/>
+          </a:xfrm>
+          <a:prstGeom prst="straightConnector1">
+            <a:avLst/>
+          </a:prstGeom>
+          <a:noFill/>
+          <a:ln w="28575" cap="flat" cmpd="sng" algn="ctr">
+            <a:solidFill>
+              <a:srgbClr val="4F81BD">
+                <a:shade val="95000"/>
+                <a:satMod val="105000"/>
+              </a:srgbClr>
+            </a:solidFill>
+            <a:prstDash val="solid"/>
+            <a:headEnd type="none" w="med" len="med"/>
+            <a:tailEnd type="none" w="med" len="med"/>
+          </a:ln>
+          <a:effectLst/>
+        </p:spPr>
+      </p:cxnSp>
+      <p:sp>
+        <p:nvSpPr>
+          <p:cNvPr id="205" name="Flèche vers le bas 204"/>
+          <p:cNvSpPr/>
+          <p:nvPr/>
+        </p:nvSpPr>
+        <p:spPr>
+          <a:xfrm>
+            <a:off x="5679289" y="1916832"/>
+            <a:ext cx="285752" cy="356238"/>
+          </a:xfrm>
+          <a:prstGeom prst="downArrow">
+            <a:avLst/>
+          </a:prstGeom>
+          <a:ln>
+            <a:prstDash val="dash"/>
+          </a:ln>
+        </p:spPr>
+        <p:style>
+          <a:lnRef idx="1">
+            <a:schemeClr val="accent2"/>
+          </a:lnRef>
+          <a:fillRef idx="2">
+            <a:schemeClr val="accent2"/>
+          </a:fillRef>
+          <a:effectRef idx="1">
+            <a:schemeClr val="accent2"/>
+          </a:effectRef>
+          <a:fontRef idx="minor">
+            <a:schemeClr val="dk1"/>
+          </a:fontRef>
+        </p:style>
+        <p:txBody>
+          <a:bodyPr rtlCol="0" anchor="ctr"/>
+          <a:lstStyle/>
+          <a:p>
+            <a:pPr algn="ctr"/>
+            <a:endParaRPr lang="fr-FR"/>
+          </a:p>
+        </p:txBody>
+      </p:sp>
+      <p:sp>
+        <p:nvSpPr>
+          <p:cNvPr id="81" name="Rectangle 80"/>
+          <p:cNvSpPr/>
+          <p:nvPr/>
+        </p:nvSpPr>
+        <p:spPr>
+          <a:xfrm>
+            <a:off x="2782528" y="2275052"/>
+            <a:ext cx="1440000" cy="576000"/>
+          </a:xfrm>
+          <a:prstGeom prst="rect">
+            <a:avLst/>
+          </a:prstGeom>
+          <a:solidFill>
+            <a:schemeClr val="accent2">
+              <a:lumMod val="40000"/>
+              <a:lumOff val="60000"/>
+            </a:schemeClr>
+          </a:solidFill>
+          <a:ln w="9525" cap="flat" cmpd="sng" algn="ctr">
+            <a:solidFill>
+              <a:srgbClr val="C0504D">
+                <a:shade val="95000"/>
+                <a:satMod val="105000"/>
+              </a:srgbClr>
+            </a:solidFill>
+            <a:prstDash val="solid"/>
+          </a:ln>
+          <a:effectLst>
+            <a:outerShdw blurRad="40000" dist="20000" dir="5400000" rotWithShape="0">
+              <a:srgbClr val="000000">
+                <a:alpha val="38000"/>
+              </a:srgbClr>
+            </a:outerShdw>
+          </a:effectLst>
+        </p:spPr>
+        <p:txBody>
+          <a:bodyPr rtlCol="0" anchor="t"/>
+          <a:lstStyle/>
+          <a:p>
+            <a:pPr algn="ctr">
+              <a:defRPr/>
+            </a:pPr>
+            <a:r>
+              <a:rPr lang="fr-FR" sz="1200" b="1" kern="0" dirty="0" smtClean="0">
+                <a:solidFill>
+                  <a:prstClr val="black"/>
+                </a:solidFill>
+                <a:latin typeface="Calibri"/>
+              </a:rPr>
+              <a:t>TRANSMETTRE</a:t>
+            </a:r>
+          </a:p>
+          <a:p>
+            <a:pPr algn="ctr">
+              <a:defRPr/>
+            </a:pPr>
+            <a:r>
+              <a:rPr lang="fr-FR" sz="1200" kern="0" dirty="0" smtClean="0">
+                <a:solidFill>
+                  <a:prstClr val="black"/>
+                </a:solidFill>
+                <a:latin typeface="Calibri"/>
+              </a:rPr>
+              <a:t>Croix De Malte</a:t>
+            </a:r>
+          </a:p>
+        </p:txBody>
+      </p:sp>
+      <p:cxnSp>
+        <p:nvCxnSpPr>
+          <p:cNvPr id="82" name="Connecteur droit 81"/>
+          <p:cNvCxnSpPr>
+            <a:endCxn id="81" idx="1"/>
+          </p:cNvCxnSpPr>
+          <p:nvPr/>
+        </p:nvCxnSpPr>
+        <p:spPr>
+          <a:xfrm>
+            <a:off x="202688" y="2563052"/>
+            <a:ext cx="2579840" cy="0"/>
+          </a:xfrm>
+          <a:prstGeom prst="line">
+            <a:avLst/>
+          </a:prstGeom>
+          <a:noFill/>
+          <a:ln w="28575" cap="flat" cmpd="sng" algn="ctr">
+            <a:solidFill>
+              <a:srgbClr val="C0504D">
+                <a:shade val="95000"/>
+                <a:satMod val="105000"/>
+              </a:srgbClr>
+            </a:solidFill>
+            <a:prstDash val="dash"/>
+            <a:headEnd type="none" w="med" len="med"/>
+            <a:tailEnd type="arrow" w="med" len="med"/>
+          </a:ln>
+          <a:effectLst/>
+        </p:spPr>
+      </p:cxnSp>
+      <p:sp>
+        <p:nvSpPr>
+          <p:cNvPr id="68" name="Rectangle 67"/>
+          <p:cNvSpPr/>
+          <p:nvPr/>
+        </p:nvSpPr>
+        <p:spPr>
+          <a:xfrm>
+            <a:off x="2776396" y="285728"/>
+            <a:ext cx="1440000" cy="576000"/>
+          </a:xfrm>
+          <a:prstGeom prst="rect">
+            <a:avLst/>
+          </a:prstGeom>
+          <a:solidFill>
+            <a:schemeClr val="tx2">
+              <a:lumMod val="40000"/>
+              <a:lumOff val="60000"/>
+            </a:schemeClr>
+          </a:solidFill>
+          <a:ln w="9525" cap="flat" cmpd="sng" algn="ctr">
+            <a:solidFill>
+              <a:srgbClr val="4F81BD">
+                <a:shade val="95000"/>
+                <a:satMod val="105000"/>
+              </a:srgbClr>
+            </a:solidFill>
+            <a:prstDash val="solid"/>
+          </a:ln>
+          <a:effectLst>
+            <a:outerShdw blurRad="40000" dist="20000" dir="5400000" rotWithShape="0">
+              <a:srgbClr val="000000">
+                <a:alpha val="38000"/>
+              </a:srgbClr>
+            </a:outerShdw>
+          </a:effectLst>
+        </p:spPr>
+        <p:txBody>
+          <a:bodyPr rtlCol="0" anchor="t"/>
+          <a:lstStyle/>
+          <a:p>
+            <a:pPr algn="ctr">
+              <a:defRPr/>
+            </a:pPr>
+            <a:r>
+              <a:rPr lang="fr-FR" sz="1200" b="1" kern="0" dirty="0" smtClean="0">
+                <a:solidFill>
+                  <a:prstClr val="black"/>
+                </a:solidFill>
+                <a:latin typeface="Calibri"/>
+              </a:rPr>
+              <a:t>RESTITUER</a:t>
+            </a:r>
+          </a:p>
+          <a:p>
+            <a:pPr algn="ctr">
+              <a:defRPr/>
+            </a:pPr>
+            <a:r>
+              <a:rPr lang="fr-FR" sz="1100" kern="0" dirty="0" smtClean="0">
+                <a:solidFill>
+                  <a:prstClr val="black"/>
+                </a:solidFill>
+                <a:latin typeface="Calibri"/>
+              </a:rPr>
+              <a:t>Boitier NI 6009</a:t>
+            </a:r>
+          </a:p>
+        </p:txBody>
+      </p:sp>
+      <p:pic>
+        <p:nvPicPr>
+          <p:cNvPr id="79" name="Picture 2" descr="F:\IMG_1394.JPG"/>
+          <p:cNvPicPr>
+            <a:picLocks noChangeAspect="1" noChangeArrowheads="1"/>
+          </p:cNvPicPr>
+          <p:nvPr/>
+        </p:nvPicPr>
+        <p:blipFill rotWithShape="1">
+          <a:blip r:embed="rId3" cstate="print"/>
+          <a:srcRect b="8903"/>
+          <a:stretch/>
+        </p:blipFill>
+        <p:spPr bwMode="auto">
+          <a:xfrm>
+            <a:off x="740119" y="915937"/>
+            <a:ext cx="705469" cy="856879"/>
+          </a:xfrm>
+          <a:prstGeom prst="rect">
+            <a:avLst/>
+          </a:prstGeom>
+          <a:noFill/>
+        </p:spPr>
+      </p:pic>
+      <p:pic>
+        <p:nvPicPr>
+          <p:cNvPr id="83" name="Picture 7" descr="2006_05020008"/>
+          <p:cNvPicPr>
+            <a:picLocks noChangeAspect="1" noChangeArrowheads="1"/>
+          </p:cNvPicPr>
+          <p:nvPr/>
+        </p:nvPicPr>
+        <p:blipFill rotWithShape="1">
+          <a:blip r:embed="rId4" cstate="print">
+            <a:extLst>
+              <a:ext uri="{28A0092B-C50C-407E-A947-70E740481C1C}">
+                <a14:useLocalDpi xmlns:a14="http://schemas.microsoft.com/office/drawing/2010/main" val="0"/>
+              </a:ext>
+            </a:extLst>
+          </a:blip>
+          <a:srcRect l="16541" t="18082" r="23135" b="7016"/>
+          <a:stretch/>
+        </p:blipFill>
+        <p:spPr bwMode="auto">
+          <a:xfrm>
+            <a:off x="1525440" y="915937"/>
+            <a:ext cx="640147" cy="856879"/>
+          </a:xfrm>
+          <a:prstGeom prst="rect">
+            <a:avLst/>
+          </a:prstGeom>
+          <a:noFill/>
+          <a:extLst>
+            <a:ext uri="{909E8E84-426E-40DD-AFC4-6F175D3DCCD1}">
+              <a14:hiddenFill xmlns:a14="http://schemas.microsoft.com/office/drawing/2010/main">
+                <a:solidFill>
+                  <a:srgbClr val="FFFFFF"/>
+                </a:solidFill>
+              </a14:hiddenFill>
+            </a:ext>
+          </a:extLst>
+        </p:spPr>
+      </p:pic>
+      <p:cxnSp>
+        <p:nvCxnSpPr>
+          <p:cNvPr id="86" name="Connecteur droit avec flèche 85"/>
+          <p:cNvCxnSpPr/>
+          <p:nvPr/>
+        </p:nvCxnSpPr>
+        <p:spPr>
+          <a:xfrm>
+            <a:off x="251520" y="457688"/>
+            <a:ext cx="488599" cy="0"/>
+          </a:xfrm>
+          <a:prstGeom prst="straightConnector1">
+            <a:avLst/>
+          </a:prstGeom>
+          <a:solidFill>
+            <a:schemeClr val="accent1">
+              <a:lumMod val="20000"/>
+              <a:lumOff val="80000"/>
+            </a:schemeClr>
+          </a:solidFill>
+          <a:ln w="28575" cap="flat" cmpd="sng" algn="ctr">
+            <a:solidFill>
+              <a:srgbClr val="4F81BD">
+                <a:shade val="95000"/>
+                <a:satMod val="105000"/>
+              </a:srgbClr>
+            </a:solidFill>
+            <a:prstDash val="solid"/>
+            <a:tailEnd type="arrow"/>
+          </a:ln>
+          <a:effectLst/>
+        </p:spPr>
+      </p:cxnSp>
+      <p:cxnSp>
+        <p:nvCxnSpPr>
+          <p:cNvPr id="88" name="Connecteur droit avec flèche 87"/>
+          <p:cNvCxnSpPr>
+            <a:stCxn id="64" idx="3"/>
+            <a:endCxn id="68" idx="1"/>
+          </p:cNvCxnSpPr>
+          <p:nvPr/>
+        </p:nvCxnSpPr>
+        <p:spPr>
+          <a:xfrm>
+            <a:off x="2165588" y="573728"/>
+            <a:ext cx="610808" cy="0"/>
+          </a:xfrm>
+          <a:prstGeom prst="straightConnector1">
+            <a:avLst/>
+          </a:prstGeom>
+          <a:solidFill>
+            <a:schemeClr val="accent1">
+              <a:lumMod val="20000"/>
+              <a:lumOff val="80000"/>
+            </a:schemeClr>
+          </a:solidFill>
+          <a:ln w="28575" cap="flat" cmpd="sng" algn="ctr">
+            <a:solidFill>
+              <a:srgbClr val="4F81BD">
+                <a:shade val="95000"/>
+                <a:satMod val="105000"/>
+              </a:srgbClr>
+            </a:solidFill>
+            <a:prstDash val="solid"/>
+            <a:tailEnd type="arrow"/>
+          </a:ln>
+          <a:effectLst/>
+        </p:spPr>
+      </p:cxnSp>
+      <p:pic>
+        <p:nvPicPr>
+          <p:cNvPr id="1026" name="Picture 2"/>
+          <p:cNvPicPr>
+            <a:picLocks noChangeAspect="1" noChangeArrowheads="1"/>
+          </p:cNvPicPr>
+          <p:nvPr/>
+        </p:nvPicPr>
+        <p:blipFill>
+          <a:blip r:embed="rId5" cstate="print">
+            <a:extLst>
+              <a:ext uri="{28A0092B-C50C-407E-A947-70E740481C1C}">
+                <a14:useLocalDpi xmlns:a14="http://schemas.microsoft.com/office/drawing/2010/main" val="0"/>
+              </a:ext>
+            </a:extLst>
+          </a:blip>
+          <a:srcRect/>
+          <a:stretch>
+            <a:fillRect/>
+          </a:stretch>
+        </p:blipFill>
+        <p:spPr bwMode="auto">
+          <a:xfrm>
+            <a:off x="3116205" y="910077"/>
+            <a:ext cx="772647" cy="822855"/>
+          </a:xfrm>
+          <a:prstGeom prst="rect">
+            <a:avLst/>
+          </a:prstGeom>
+          <a:noFill/>
+          <a:ln>
+            <a:noFill/>
+          </a:ln>
+          <a:effectLst/>
+          <a:extLst>
+            <a:ext uri="{909E8E84-426E-40DD-AFC4-6F175D3DCCD1}">
+              <a14:hiddenFill xmlns:a14="http://schemas.microsoft.com/office/drawing/2010/main">
+                <a:solidFill>
+                  <a:schemeClr val="accent1"/>
+                </a:solidFill>
+              </a14:hiddenFill>
+            </a:ext>
+            <a:ext uri="{91240B29-F687-4F45-9708-019B960494DF}">
+              <a14:hiddenLine xmlns:a14="http://schemas.microsoft.com/office/drawing/2010/main" w="9525">
+                <a:solidFill>
+                  <a:schemeClr val="tx1"/>
+                </a:solidFill>
+                <a:miter lim="800000"/>
+                <a:headEnd/>
+                <a:tailEnd/>
+              </a14:hiddenLine>
+            </a:ext>
+            <a:ext uri="{AF507438-7753-43E0-B8FC-AC1667EBCBE1}">
+              <a14:hiddenEffects xmlns:a14="http://schemas.microsoft.com/office/drawing/2010/main">
+                <a:effectLst>
+                  <a:outerShdw dist="35921" dir="2700000" algn="ctr" rotWithShape="0">
+                    <a:schemeClr val="bg2"/>
+                  </a:outerShdw>
+                </a:effectLst>
+              </a14:hiddenEffects>
+            </a:ext>
+          </a:extLst>
+        </p:spPr>
+      </p:pic>
+      <p:cxnSp>
+        <p:nvCxnSpPr>
+          <p:cNvPr id="89" name="Connecteur droit avec flèche 88"/>
+          <p:cNvCxnSpPr/>
+          <p:nvPr/>
+        </p:nvCxnSpPr>
+        <p:spPr>
+          <a:xfrm>
+            <a:off x="4214810" y="573728"/>
+            <a:ext cx="610808" cy="0"/>
+          </a:xfrm>
+          <a:prstGeom prst="straightConnector1">
+            <a:avLst/>
+          </a:prstGeom>
+          <a:solidFill>
+            <a:schemeClr val="accent1">
+              <a:lumMod val="20000"/>
+              <a:lumOff val="80000"/>
+            </a:schemeClr>
+          </a:solidFill>
+          <a:ln w="28575" cap="flat" cmpd="sng" algn="ctr">
+            <a:solidFill>
+              <a:srgbClr val="4F81BD">
+                <a:shade val="95000"/>
+                <a:satMod val="105000"/>
+              </a:srgbClr>
+            </a:solidFill>
+            <a:prstDash val="solid"/>
+            <a:tailEnd type="arrow"/>
+          </a:ln>
+          <a:effectLst/>
+        </p:spPr>
+      </p:cxnSp>
+      <p:cxnSp>
+        <p:nvCxnSpPr>
+          <p:cNvPr id="90" name="Connecteur droit 89"/>
+          <p:cNvCxnSpPr>
+            <a:stCxn id="81" idx="3"/>
+          </p:cNvCxnSpPr>
+          <p:nvPr/>
+        </p:nvCxnSpPr>
+        <p:spPr>
+          <a:xfrm>
+            <a:off x="4222528" y="2563052"/>
+            <a:ext cx="1063852" cy="0"/>
+          </a:xfrm>
+          <a:prstGeom prst="line">
+            <a:avLst/>
+          </a:prstGeom>
+          <a:noFill/>
+          <a:ln w="28575" cap="flat" cmpd="sng" algn="ctr">
+            <a:solidFill>
+              <a:srgbClr val="C0504D">
+                <a:shade val="95000"/>
+                <a:satMod val="105000"/>
+              </a:srgbClr>
+            </a:solidFill>
+            <a:prstDash val="dash"/>
+            <a:headEnd type="none" w="med" len="med"/>
+            <a:tailEnd type="arrow" w="med" len="med"/>
+          </a:ln>
+          <a:effectLst/>
+        </p:spPr>
+      </p:cxnSp>
+      <p:sp>
+        <p:nvSpPr>
+          <p:cNvPr id="95" name="Flèche vers le bas 94"/>
+          <p:cNvSpPr/>
+          <p:nvPr/>
+        </p:nvSpPr>
+        <p:spPr>
+          <a:xfrm>
+            <a:off x="5679289" y="3085860"/>
+            <a:ext cx="285752" cy="356238"/>
+          </a:xfrm>
+          <a:prstGeom prst="downArrow">
+            <a:avLst/>
+          </a:prstGeom>
+          <a:ln>
+            <a:prstDash val="dash"/>
+          </a:ln>
+        </p:spPr>
+        <p:style>
+          <a:lnRef idx="1">
+            <a:schemeClr val="accent2"/>
+          </a:lnRef>
+          <a:fillRef idx="2">
+            <a:schemeClr val="accent2"/>
+          </a:fillRef>
+          <a:effectRef idx="1">
+            <a:schemeClr val="accent2"/>
+          </a:effectRef>
+          <a:fontRef idx="minor">
+            <a:schemeClr val="dk1"/>
+          </a:fontRef>
+        </p:style>
+        <p:txBody>
+          <a:bodyPr rtlCol="0" anchor="ctr"/>
+          <a:lstStyle/>
+          <a:p>
+            <a:pPr algn="ctr"/>
+            <a:endParaRPr lang="fr-FR"/>
+          </a:p>
+        </p:txBody>
+      </p:sp>
+      <p:cxnSp>
+        <p:nvCxnSpPr>
+          <p:cNvPr id="96" name="Connecteur droit avec flèche 95"/>
+          <p:cNvCxnSpPr/>
+          <p:nvPr/>
+        </p:nvCxnSpPr>
+        <p:spPr>
+          <a:xfrm>
+            <a:off x="357158" y="2348880"/>
+            <a:ext cx="2425370" cy="0"/>
+          </a:xfrm>
+          <a:prstGeom prst="straightConnector1">
+            <a:avLst/>
+          </a:prstGeom>
+          <a:noFill/>
+          <a:ln w="28575" cap="flat" cmpd="sng" algn="ctr">
+            <a:solidFill>
+              <a:srgbClr val="4F81BD">
+                <a:shade val="95000"/>
+                <a:satMod val="105000"/>
+              </a:srgbClr>
+            </a:solidFill>
+            <a:prstDash val="solid"/>
+            <a:headEnd type="none" w="med" len="med"/>
+            <a:tailEnd type="none" w="med" len="med"/>
+          </a:ln>
+          <a:effectLst/>
+        </p:spPr>
+      </p:cxnSp>
+      <p:cxnSp>
+        <p:nvCxnSpPr>
+          <p:cNvPr id="103" name="Connecteur droit avec flèche 102"/>
+          <p:cNvCxnSpPr/>
+          <p:nvPr/>
+        </p:nvCxnSpPr>
+        <p:spPr>
+          <a:xfrm>
+            <a:off x="251520" y="2406225"/>
+            <a:ext cx="2531008" cy="0"/>
+          </a:xfrm>
+          <a:prstGeom prst="straightConnector1">
+            <a:avLst/>
+          </a:prstGeom>
+          <a:noFill/>
+          <a:ln w="28575" cap="flat" cmpd="sng" algn="ctr">
+            <a:solidFill>
+              <a:srgbClr val="4F81BD">
+                <a:shade val="95000"/>
+                <a:satMod val="105000"/>
+              </a:srgbClr>
+            </a:solidFill>
+            <a:prstDash val="solid"/>
+            <a:headEnd type="none" w="med" len="med"/>
+            <a:tailEnd type="none" w="med" len="med"/>
+          </a:ln>
+          <a:effectLst/>
+        </p:spPr>
+      </p:cxnSp>
+      <p:cxnSp>
+        <p:nvCxnSpPr>
+          <p:cNvPr id="111" name="Connecteur droit avec flèche 110"/>
+          <p:cNvCxnSpPr/>
+          <p:nvPr/>
+        </p:nvCxnSpPr>
+        <p:spPr>
+          <a:xfrm flipV="1">
+            <a:off x="251520" y="457688"/>
+            <a:ext cx="0" cy="1948537"/>
+          </a:xfrm>
+          <a:prstGeom prst="straightConnector1">
+            <a:avLst/>
+          </a:prstGeom>
+          <a:noFill/>
+          <a:ln w="28575" cap="flat" cmpd="sng" algn="ctr">
+            <a:solidFill>
+              <a:srgbClr val="4F81BD">
+                <a:shade val="95000"/>
+                <a:satMod val="105000"/>
+              </a:srgbClr>
+            </a:solidFill>
+            <a:prstDash val="solid"/>
+            <a:headEnd type="none" w="med" len="med"/>
+            <a:tailEnd type="none" w="med" len="med"/>
+          </a:ln>
+          <a:effectLst/>
+        </p:spPr>
+      </p:cxnSp>
+      <p:pic>
+        <p:nvPicPr>
+          <p:cNvPr id="115" name="Image 114" descr="IMG_20141010_154434.jpg"/>
+          <p:cNvPicPr>
+            <a:picLocks noChangeAspect="1"/>
+          </p:cNvPicPr>
+          <p:nvPr/>
+        </p:nvPicPr>
+        <p:blipFill rotWithShape="1">
+          <a:blip r:embed="rId6" cstate="print">
+            <a:extLst>
+              <a:ext uri="{28A0092B-C50C-407E-A947-70E740481C1C}">
+                <a14:useLocalDpi xmlns:a14="http://schemas.microsoft.com/office/drawing/2010/main" val="0"/>
+              </a:ext>
+            </a:extLst>
+          </a:blip>
+          <a:srcRect l="4063" t="8197" r="1376" b="20294"/>
+          <a:stretch/>
+        </p:blipFill>
+        <p:spPr>
+          <a:xfrm>
+            <a:off x="2318336" y="2974046"/>
+            <a:ext cx="928384" cy="936104"/>
+          </a:xfrm>
+          <a:prstGeom prst="rect">
+            <a:avLst/>
+          </a:prstGeom>
+        </p:spPr>
+      </p:pic>
+      <p:pic>
+        <p:nvPicPr>
+          <p:cNvPr id="116" name="Image 115" descr="IMG_20141010_154425.jpg"/>
+          <p:cNvPicPr>
+            <a:picLocks noChangeAspect="1"/>
+          </p:cNvPicPr>
+          <p:nvPr/>
+        </p:nvPicPr>
+        <p:blipFill>
+          <a:blip r:embed="rId7" cstate="print">
+            <a:extLst>
+              <a:ext uri="{28A0092B-C50C-407E-A947-70E740481C1C}">
+                <a14:useLocalDpi xmlns:a14="http://schemas.microsoft.com/office/drawing/2010/main" val="0"/>
+              </a:ext>
+            </a:extLst>
+          </a:blip>
+          <a:stretch>
+            <a:fillRect/>
+          </a:stretch>
+        </p:blipFill>
+        <p:spPr>
+          <a:xfrm>
+            <a:off x="3502528" y="2974046"/>
+            <a:ext cx="1248139" cy="936104"/>
+          </a:xfrm>
+          <a:prstGeom prst="rect">
+            <a:avLst/>
+          </a:prstGeom>
+        </p:spPr>
+      </p:pic>
+      <p:pic>
+        <p:nvPicPr>
+          <p:cNvPr id="118" name="Image 117"/>
+          <p:cNvPicPr/>
+          <p:nvPr/>
+        </p:nvPicPr>
+        <p:blipFill>
+          <a:blip r:embed="rId8" cstate="print">
+            <a:extLst>
+              <a:ext uri="{28A0092B-C50C-407E-A947-70E740481C1C}">
+                <a14:useLocalDpi xmlns:a14="http://schemas.microsoft.com/office/drawing/2010/main" val="0"/>
+              </a:ext>
+            </a:extLst>
+          </a:blip>
+          <a:stretch>
+            <a:fillRect/>
+          </a:stretch>
+        </p:blipFill>
+        <p:spPr>
+          <a:xfrm>
+            <a:off x="4750667" y="3085860"/>
+            <a:ext cx="1349694" cy="1462087"/>
+          </a:xfrm>
+          <a:prstGeom prst="rect">
+            <a:avLst/>
+          </a:prstGeom>
+          <a:ln>
+            <a:noFill/>
+          </a:ln>
+          <a:effectLst>
+            <a:outerShdw blurRad="292100" dist="139700" dir="2700000" algn="tl" rotWithShape="0">
+              <a:srgbClr val="333333">
+                <a:alpha val="65000"/>
+              </a:srgbClr>
+            </a:outerShdw>
+          </a:effectLst>
+        </p:spPr>
+      </p:pic>
+      <p:pic>
+        <p:nvPicPr>
+          <p:cNvPr id="1027" name="Picture 3"/>
+          <p:cNvPicPr>
+            <a:picLocks noChangeAspect="1" noChangeArrowheads="1"/>
+          </p:cNvPicPr>
+          <p:nvPr/>
+        </p:nvPicPr>
+        <p:blipFill>
+          <a:blip r:embed="rId9">
+            <a:extLst>
+              <a:ext uri="{28A0092B-C50C-407E-A947-70E740481C1C}">
+                <a14:useLocalDpi xmlns:a14="http://schemas.microsoft.com/office/drawing/2010/main" val="0"/>
+              </a:ext>
+            </a:extLst>
+          </a:blip>
+          <a:srcRect/>
+          <a:stretch>
+            <a:fillRect/>
+          </a:stretch>
+        </p:blipFill>
+        <p:spPr bwMode="auto">
+          <a:xfrm>
+            <a:off x="740119" y="2982517"/>
+            <a:ext cx="1481137" cy="919162"/>
+          </a:xfrm>
+          <a:prstGeom prst="rect">
+            <a:avLst/>
+          </a:prstGeom>
+          <a:noFill/>
+          <a:ln>
+            <a:noFill/>
+          </a:ln>
+          <a:effectLst/>
+          <a:extLst>
+            <a:ext uri="{909E8E84-426E-40DD-AFC4-6F175D3DCCD1}">
+              <a14:hiddenFill xmlns:a14="http://schemas.microsoft.com/office/drawing/2010/main">
+                <a:solidFill>
+                  <a:schemeClr val="accent1"/>
+                </a:solidFill>
+              </a14:hiddenFill>
+            </a:ext>
+            <a:ext uri="{91240B29-F687-4F45-9708-019B960494DF}">
+              <a14:hiddenLine xmlns:a14="http://schemas.microsoft.com/office/drawing/2010/main" w="9525">
+                <a:solidFill>
+                  <a:schemeClr val="tx1"/>
+                </a:solidFill>
+                <a:miter lim="800000"/>
+                <a:headEnd/>
+                <a:tailEnd/>
+              </a14:hiddenLine>
+            </a:ext>
+            <a:ext uri="{AF507438-7753-43E0-B8FC-AC1667EBCBE1}">
+              <a14:hiddenEffects xmlns:a14="http://schemas.microsoft.com/office/drawing/2010/main">
+                <a:effectLst>
+                  <a:outerShdw dist="35921" dir="2700000" algn="ctr" rotWithShape="0">
+                    <a:schemeClr val="bg2"/>
+                  </a:outerShdw>
+                </a:effectLst>
+              </a14:hiddenEffects>
+            </a:ext>
+          </a:extLst>
+        </p:spPr>
+      </p:pic>
+    </p:spTree>
+    <p:extLst>
+      <p:ext uri="{BB962C8B-B14F-4D97-AF65-F5344CB8AC3E}">
+        <p14:creationId xmlns:p14="http://schemas.microsoft.com/office/powerpoint/2010/main" val="4223053527"/>
+      </p:ext>
+    </p:extLst>
+  </p:cSld>
+  <p:clrMapOvr>
+    <a:masterClrMapping/>
+  </p:clrMapOvr>
+</p:sld>
+</file>
+
+<file path=ppt/slides/slide5.xml><?xml version="1.0" encoding="utf-8"?>
+<p:sld xmlns:a="http://schemas.openxmlformats.org/drawingml/2006/main" xmlns:r="http://schemas.openxmlformats.org/officeDocument/2006/relationships" xmlns:p="http://schemas.openxmlformats.org/presentationml/2006/main">
+  <p:cSld>
+    <p:spTree>
+      <p:nvGrpSpPr>
+        <p:cNvPr id="1" name=""/>
+        <p:cNvGrpSpPr/>
+        <p:nvPr/>
+      </p:nvGrpSpPr>
+      <p:grpSpPr>
+        <a:xfrm>
+          <a:off x="0" y="0"/>
+          <a:ext cx="0" cy="0"/>
+          <a:chOff x="0" y="0"/>
+          <a:chExt cx="0" cy="0"/>
+        </a:xfrm>
+      </p:grpSpPr>
+      <p:sp>
+        <p:nvSpPr>
+          <p:cNvPr id="40" name="Rectangle à coins arrondis 39"/>
+          <p:cNvSpPr/>
+          <p:nvPr/>
+        </p:nvSpPr>
+        <p:spPr>
+          <a:xfrm>
             <a:off x="2714612" y="3120620"/>
             <a:ext cx="8581126" cy="1729778"/>
           </a:xfrm>
@@ -11813,7 +13308,7 @@
 </p:sld>
 </file>
 
-<file path=ppt/slides/slide5.xml><?xml version="1.0" encoding="utf-8"?>
+<file path=ppt/slides/slide6.xml><?xml version="1.0" encoding="utf-8"?>
 <p:sld xmlns:a="http://schemas.openxmlformats.org/drawingml/2006/main" xmlns:r="http://schemas.openxmlformats.org/officeDocument/2006/relationships" xmlns:p="http://schemas.openxmlformats.org/presentationml/2006/main">
   <p:cSld>
     <p:spTree>
@@ -13488,7 +14983,7 @@
 </p:sld>
 </file>
 
-<file path=ppt/slides/slide6.xml><?xml version="1.0" encoding="utf-8"?>
+<file path=ppt/slides/slide7.xml><?xml version="1.0" encoding="utf-8"?>
 <p:sld xmlns:a="http://schemas.openxmlformats.org/drawingml/2006/main" xmlns:r="http://schemas.openxmlformats.org/officeDocument/2006/relationships" xmlns:p="http://schemas.openxmlformats.org/presentationml/2006/main">
   <p:cSld>
     <p:spTree>

</xml_diff>

<commit_message>
MAJ Chaine fonctionnelle du tiroir vertical
</commit_message>
<xml_diff>
--- a/Capsuleuse/ChaineFonctionnelleCapsuleuse.pptx
+++ b/Capsuleuse/ChaineFonctionnelleCapsuleuse.pptx
@@ -5,16 +5,17 @@
     <p:sldMasterId id="2147483648" r:id="rId1"/>
   </p:sldMasterIdLst>
   <p:notesMasterIdLst>
-    <p:notesMasterId r:id="rId9"/>
+    <p:notesMasterId r:id="rId10"/>
   </p:notesMasterIdLst>
   <p:sldIdLst>
     <p:sldId id="263" r:id="rId2"/>
-    <p:sldId id="265" r:id="rId3"/>
-    <p:sldId id="264" r:id="rId4"/>
-    <p:sldId id="266" r:id="rId5"/>
-    <p:sldId id="258" r:id="rId6"/>
-    <p:sldId id="259" r:id="rId7"/>
-    <p:sldId id="260" r:id="rId8"/>
+    <p:sldId id="267" r:id="rId3"/>
+    <p:sldId id="265" r:id="rId4"/>
+    <p:sldId id="264" r:id="rId5"/>
+    <p:sldId id="266" r:id="rId6"/>
+    <p:sldId id="258" r:id="rId7"/>
+    <p:sldId id="259" r:id="rId8"/>
+    <p:sldId id="260" r:id="rId9"/>
   </p:sldIdLst>
   <p:sldSz cx="9144000" cy="6858000" type="screen4x3"/>
   <p:notesSz cx="6858000" cy="9144000"/>
@@ -198,7 +199,7 @@
           <a:p>
             <a:fld id="{B74FA7BB-1A3F-4A67-8555-C00500105A10}" type="datetimeFigureOut">
               <a:rPr lang="fr-FR" smtClean="0"/>
-              <a:t>06/01/2015</a:t>
+              <a:t>15/01/2015</a:t>
             </a:fld>
             <a:endParaRPr lang="fr-FR"/>
           </a:p>
@@ -792,6 +793,87 @@
 </p:notes>
 </file>
 
+<file path=ppt/notesSlides/notesSlide5.xml><?xml version="1.0" encoding="utf-8"?>
+<p:notes xmlns:a="http://schemas.openxmlformats.org/drawingml/2006/main" xmlns:r="http://schemas.openxmlformats.org/officeDocument/2006/relationships" xmlns:p="http://schemas.openxmlformats.org/presentationml/2006/main">
+  <p:cSld>
+    <p:spTree>
+      <p:nvGrpSpPr>
+        <p:cNvPr id="1" name=""/>
+        <p:cNvGrpSpPr/>
+        <p:nvPr/>
+      </p:nvGrpSpPr>
+      <p:grpSpPr>
+        <a:xfrm>
+          <a:off x="0" y="0"/>
+          <a:ext cx="0" cy="0"/>
+          <a:chOff x="0" y="0"/>
+          <a:chExt cx="0" cy="0"/>
+        </a:xfrm>
+      </p:grpSpPr>
+      <p:sp>
+        <p:nvSpPr>
+          <p:cNvPr id="2" name="Espace réservé de l'image des diapositives 1"/>
+          <p:cNvSpPr>
+            <a:spLocks noGrp="1" noRot="1" noChangeAspect="1"/>
+          </p:cNvSpPr>
+          <p:nvPr>
+            <p:ph type="sldImg"/>
+          </p:nvPr>
+        </p:nvSpPr>
+        <p:spPr/>
+      </p:sp>
+      <p:sp>
+        <p:nvSpPr>
+          <p:cNvPr id="3" name="Espace réservé des commentaires 2"/>
+          <p:cNvSpPr>
+            <a:spLocks noGrp="1"/>
+          </p:cNvSpPr>
+          <p:nvPr>
+            <p:ph type="body" idx="1"/>
+          </p:nvPr>
+        </p:nvSpPr>
+        <p:spPr/>
+        <p:txBody>
+          <a:bodyPr>
+            <a:normAutofit/>
+          </a:bodyPr>
+          <a:lstStyle/>
+          <a:p>
+            <a:endParaRPr lang="fr-FR" dirty="0"/>
+          </a:p>
+        </p:txBody>
+      </p:sp>
+      <p:sp>
+        <p:nvSpPr>
+          <p:cNvPr id="4" name="Espace réservé du numéro de diapositive 3"/>
+          <p:cNvSpPr>
+            <a:spLocks noGrp="1"/>
+          </p:cNvSpPr>
+          <p:nvPr>
+            <p:ph type="sldNum" sz="quarter" idx="10"/>
+          </p:nvPr>
+        </p:nvSpPr>
+        <p:spPr/>
+        <p:txBody>
+          <a:bodyPr/>
+          <a:lstStyle/>
+          <a:p>
+            <a:fld id="{145E6FF7-9CB1-4061-B950-98AB253EA254}" type="slidenum">
+              <a:rPr lang="fr-FR" smtClean="0"/>
+              <a:t>5</a:t>
+            </a:fld>
+            <a:endParaRPr lang="fr-FR"/>
+          </a:p>
+        </p:txBody>
+      </p:sp>
+    </p:spTree>
+  </p:cSld>
+  <p:clrMapOvr>
+    <a:masterClrMapping/>
+  </p:clrMapOvr>
+</p:notes>
+</file>
+
 <file path=ppt/slideLayouts/slideLayout1.xml><?xml version="1.0" encoding="utf-8"?>
 <p:sldLayout xmlns:a="http://schemas.openxmlformats.org/drawingml/2006/main" xmlns:r="http://schemas.openxmlformats.org/officeDocument/2006/relationships" xmlns:p="http://schemas.openxmlformats.org/presentationml/2006/main" type="title" preserve="1">
   <p:cSld name="Diapositive de titre">
@@ -974,7 +1056,7 @@
             <a:fld id="{AA309A6D-C09C-4548-B29A-6CF363A7E532}" type="datetimeFigureOut">
               <a:rPr lang="fr-FR" smtClean="0"/>
               <a:pPr/>
-              <a:t>06/01/2015</a:t>
+              <a:t>15/01/2015</a:t>
             </a:fld>
             <a:endParaRPr lang="fr-BE"/>
           </a:p>
@@ -1141,7 +1223,7 @@
             <a:fld id="{AA309A6D-C09C-4548-B29A-6CF363A7E532}" type="datetimeFigureOut">
               <a:rPr lang="fr-FR" smtClean="0"/>
               <a:pPr/>
-              <a:t>06/01/2015</a:t>
+              <a:t>15/01/2015</a:t>
             </a:fld>
             <a:endParaRPr lang="fr-BE"/>
           </a:p>
@@ -1318,7 +1400,7 @@
             <a:fld id="{AA309A6D-C09C-4548-B29A-6CF363A7E532}" type="datetimeFigureOut">
               <a:rPr lang="fr-FR" smtClean="0"/>
               <a:pPr/>
-              <a:t>06/01/2015</a:t>
+              <a:t>15/01/2015</a:t>
             </a:fld>
             <a:endParaRPr lang="fr-BE"/>
           </a:p>
@@ -1485,7 +1567,7 @@
             <a:fld id="{AA309A6D-C09C-4548-B29A-6CF363A7E532}" type="datetimeFigureOut">
               <a:rPr lang="fr-FR" smtClean="0"/>
               <a:pPr/>
-              <a:t>06/01/2015</a:t>
+              <a:t>15/01/2015</a:t>
             </a:fld>
             <a:endParaRPr lang="fr-BE"/>
           </a:p>
@@ -1728,7 +1810,7 @@
             <a:fld id="{AA309A6D-C09C-4548-B29A-6CF363A7E532}" type="datetimeFigureOut">
               <a:rPr lang="fr-FR" smtClean="0"/>
               <a:pPr/>
-              <a:t>06/01/2015</a:t>
+              <a:t>15/01/2015</a:t>
             </a:fld>
             <a:endParaRPr lang="fr-BE"/>
           </a:p>
@@ -2013,7 +2095,7 @@
             <a:fld id="{AA309A6D-C09C-4548-B29A-6CF363A7E532}" type="datetimeFigureOut">
               <a:rPr lang="fr-FR" smtClean="0"/>
               <a:pPr/>
-              <a:t>06/01/2015</a:t>
+              <a:t>15/01/2015</a:t>
             </a:fld>
             <a:endParaRPr lang="fr-BE"/>
           </a:p>
@@ -2432,7 +2514,7 @@
             <a:fld id="{AA309A6D-C09C-4548-B29A-6CF363A7E532}" type="datetimeFigureOut">
               <a:rPr lang="fr-FR" smtClean="0"/>
               <a:pPr/>
-              <a:t>06/01/2015</a:t>
+              <a:t>15/01/2015</a:t>
             </a:fld>
             <a:endParaRPr lang="fr-BE"/>
           </a:p>
@@ -2547,7 +2629,7 @@
             <a:fld id="{AA309A6D-C09C-4548-B29A-6CF363A7E532}" type="datetimeFigureOut">
               <a:rPr lang="fr-FR" smtClean="0"/>
               <a:pPr/>
-              <a:t>06/01/2015</a:t>
+              <a:t>15/01/2015</a:t>
             </a:fld>
             <a:endParaRPr lang="fr-BE"/>
           </a:p>
@@ -2639,7 +2721,7 @@
             <a:fld id="{AA309A6D-C09C-4548-B29A-6CF363A7E532}" type="datetimeFigureOut">
               <a:rPr lang="fr-FR" smtClean="0"/>
               <a:pPr/>
-              <a:t>06/01/2015</a:t>
+              <a:t>15/01/2015</a:t>
             </a:fld>
             <a:endParaRPr lang="fr-BE"/>
           </a:p>
@@ -2913,7 +2995,7 @@
             <a:fld id="{AA309A6D-C09C-4548-B29A-6CF363A7E532}" type="datetimeFigureOut">
               <a:rPr lang="fr-FR" smtClean="0"/>
               <a:pPr/>
-              <a:t>06/01/2015</a:t>
+              <a:t>15/01/2015</a:t>
             </a:fld>
             <a:endParaRPr lang="fr-BE"/>
           </a:p>
@@ -3163,7 +3245,7 @@
             <a:fld id="{AA309A6D-C09C-4548-B29A-6CF363A7E532}" type="datetimeFigureOut">
               <a:rPr lang="fr-FR" smtClean="0"/>
               <a:pPr/>
-              <a:t>06/01/2015</a:t>
+              <a:t>15/01/2015</a:t>
             </a:fld>
             <a:endParaRPr lang="fr-BE"/>
           </a:p>
@@ -3373,7 +3455,7 @@
             <a:fld id="{AA309A6D-C09C-4548-B29A-6CF363A7E532}" type="datetimeFigureOut">
               <a:rPr lang="fr-FR" smtClean="0"/>
               <a:pPr/>
-              <a:t>06/01/2015</a:t>
+              <a:t>15/01/2015</a:t>
             </a:fld>
             <a:endParaRPr lang="fr-BE"/>
           </a:p>
@@ -5198,9 +5280,9 @@
           <p:nvPr/>
         </p:nvCxnSpPr>
         <p:spPr>
-          <a:xfrm rot="5400000" flipH="1" flipV="1">
-            <a:off x="5751521" y="3607595"/>
-            <a:ext cx="785024" cy="794"/>
+          <a:xfrm flipV="1">
+            <a:off x="4356770" y="3228367"/>
+            <a:ext cx="0" cy="558617"/>
           </a:xfrm>
           <a:prstGeom prst="straightConnector1">
             <a:avLst/>
@@ -5227,9 +5309,9 @@
           <p:nvPr/>
         </p:nvCxnSpPr>
         <p:spPr>
-          <a:xfrm rot="10800000">
+          <a:xfrm flipH="1" flipV="1">
             <a:off x="357158" y="3214686"/>
-            <a:ext cx="5786478" cy="1588"/>
+            <a:ext cx="3999612" cy="1589"/>
           </a:xfrm>
           <a:prstGeom prst="straightConnector1">
             <a:avLst/>
@@ -5441,6 +5523,39 @@
           <a:effectLst/>
         </p:spPr>
       </p:cxnSp>
+      <p:pic>
+        <p:nvPicPr>
+          <p:cNvPr id="36" name="Picture 5"/>
+          <p:cNvPicPr>
+            <a:picLocks noChangeAspect="1" noChangeArrowheads="1"/>
+          </p:cNvPicPr>
+          <p:nvPr/>
+        </p:nvPicPr>
+        <p:blipFill>
+          <a:blip r:embed="rId3" cstate="print"/>
+          <a:srcRect/>
+          <a:stretch>
+            <a:fillRect/>
+          </a:stretch>
+        </p:blipFill>
+        <p:spPr bwMode="auto">
+          <a:xfrm>
+            <a:off x="2964645" y="490463"/>
+            <a:ext cx="1071570" cy="1002911"/>
+          </a:xfrm>
+          <a:prstGeom prst="rect">
+            <a:avLst/>
+          </a:prstGeom>
+          <a:noFill/>
+          <a:ln w="9525">
+            <a:noFill/>
+            <a:miter lim="800000"/>
+            <a:headEnd/>
+            <a:tailEnd/>
+          </a:ln>
+          <a:effectLst/>
+        </p:spPr>
+      </p:pic>
     </p:spTree>
   </p:cSld>
   <p:clrMapOvr>
@@ -5500,7 +5615,7 @@
           <a:bodyPr rtlCol="0" anchor="b"/>
           <a:lstStyle/>
           <a:p>
-            <a:pPr marL="0" marR="0" lvl="0" indent="0" algn="ctr" defTabSz="914400" eaLnBrk="1" fontAlgn="auto" latinLnBrk="0" hangingPunct="1">
+            <a:pPr marL="0" marR="0" lvl="0" indent="0" defTabSz="914400" eaLnBrk="1" fontAlgn="auto" latinLnBrk="0" hangingPunct="1">
               <a:lnSpc>
                 <a:spcPct val="100000"/>
               </a:lnSpc>
@@ -5596,13 +5711,27 @@
               <a:defRPr/>
             </a:pPr>
             <a:r>
-              <a:rPr lang="fr-FR" sz="1200" kern="0" dirty="0" smtClean="0">
+              <a:rPr lang="fr-FR" sz="1000" kern="0" dirty="0" smtClean="0">
                 <a:solidFill>
                   <a:prstClr val="black"/>
                 </a:solidFill>
                 <a:latin typeface="Calibri"/>
               </a:rPr>
-              <a:t>Transformateur</a:t>
+              <a:t>Réseau pneumatique</a:t>
+            </a:r>
+          </a:p>
+          <a:p>
+            <a:pPr algn="ctr">
+              <a:defRPr/>
+            </a:pPr>
+            <a:r>
+              <a:rPr lang="fr-FR" sz="1000" kern="0" dirty="0" smtClean="0">
+                <a:solidFill>
+                  <a:prstClr val="black"/>
+                </a:solidFill>
+                <a:latin typeface="Calibri"/>
+              </a:rPr>
+              <a:t>Filtre …</a:t>
             </a:r>
           </a:p>
         </p:txBody>
@@ -5671,7 +5800,7 @@
                   <a:prstClr val="black"/>
                 </a:solidFill>
               </a:rPr>
-              <a:t>Automate</a:t>
+              <a:t>Distributeurs pneumatiques </a:t>
             </a:r>
           </a:p>
         </p:txBody>
@@ -5773,8 +5902,14 @@
                 </a:solidFill>
                 <a:latin typeface="Calibri"/>
               </a:rPr>
-              <a:t>Moteur à courant continu</a:t>
-            </a:r>
+              <a:t>Vérin linéaire</a:t>
+            </a:r>
+            <a:endParaRPr lang="fr-FR" sz="1200" kern="0" dirty="0" smtClean="0">
+              <a:solidFill>
+                <a:prstClr val="black"/>
+              </a:solidFill>
+              <a:latin typeface="Calibri"/>
+            </a:endParaRPr>
           </a:p>
         </p:txBody>
       </p:sp>
@@ -5896,8 +6031,14 @@
                 </a:solidFill>
                 <a:latin typeface="Calibri"/>
               </a:rPr>
-              <a:t>Tapis roulant</a:t>
-            </a:r>
+              <a:t>Ensemble ventouse</a:t>
+            </a:r>
+            <a:endParaRPr lang="fr-FR" sz="1200" kern="0" dirty="0" smtClean="0">
+              <a:solidFill>
+                <a:prstClr val="black"/>
+              </a:solidFill>
+              <a:latin typeface="Calibri"/>
+            </a:endParaRPr>
           </a:p>
         </p:txBody>
       </p:sp>
@@ -6612,85 +6753,6 @@
           </a:p>
         </p:txBody>
       </p:sp>
-      <p:sp>
-        <p:nvSpPr>
-          <p:cNvPr id="162" name="Rectangle 161"/>
-          <p:cNvSpPr/>
-          <p:nvPr/>
-        </p:nvSpPr>
-        <p:spPr>
-          <a:xfrm>
-            <a:off x="488794" y="4714884"/>
-            <a:ext cx="1440000" cy="576000"/>
-          </a:xfrm>
-          <a:prstGeom prst="rect">
-            <a:avLst/>
-          </a:prstGeom>
-          <a:solidFill>
-            <a:schemeClr val="accent2">
-              <a:lumMod val="40000"/>
-              <a:lumOff val="60000"/>
-            </a:schemeClr>
-          </a:solidFill>
-          <a:ln w="9525" cap="flat" cmpd="sng" algn="ctr">
-            <a:solidFill>
-              <a:srgbClr val="C0504D">
-                <a:shade val="95000"/>
-                <a:satMod val="105000"/>
-              </a:srgbClr>
-            </a:solidFill>
-            <a:prstDash val="solid"/>
-          </a:ln>
-          <a:effectLst>
-            <a:outerShdw blurRad="40000" dist="20000" dir="5400000" rotWithShape="0">
-              <a:srgbClr val="000000">
-                <a:alpha val="38000"/>
-              </a:srgbClr>
-            </a:outerShdw>
-          </a:effectLst>
-        </p:spPr>
-        <p:txBody>
-          <a:bodyPr rtlCol="0" anchor="t"/>
-          <a:lstStyle/>
-          <a:p>
-            <a:pPr algn="ctr">
-              <a:defRPr/>
-            </a:pPr>
-            <a:r>
-              <a:rPr lang="fr-FR" sz="1200" b="1" kern="0" dirty="0" smtClean="0">
-                <a:solidFill>
-                  <a:prstClr val="black"/>
-                </a:solidFill>
-                <a:latin typeface="Calibri"/>
-              </a:rPr>
-              <a:t>TRANSMETTRE</a:t>
-            </a:r>
-          </a:p>
-          <a:p>
-            <a:pPr algn="ctr">
-              <a:defRPr/>
-            </a:pPr>
-            <a:r>
-              <a:rPr lang="fr-FR" sz="1200" kern="0" dirty="0" smtClean="0">
-                <a:solidFill>
-                  <a:prstClr val="black"/>
-                </a:solidFill>
-              </a:rPr>
-              <a:t>Réducteur roue et vis sans fin</a:t>
-            </a:r>
-          </a:p>
-          <a:p>
-            <a:pPr algn="ctr">
-              <a:defRPr/>
-            </a:pPr>
-            <a:endParaRPr lang="fr-FR" sz="1200" kern="0" dirty="0" smtClean="0">
-              <a:solidFill>
-                <a:prstClr val="black"/>
-              </a:solidFill>
-            </a:endParaRPr>
-          </a:p>
-        </p:txBody>
-      </p:sp>
       <p:cxnSp>
         <p:nvCxnSpPr>
           <p:cNvPr id="170" name="Connecteur droit 169"/>
@@ -6722,74 +6784,14 @@
       </p:cxnSp>
       <p:cxnSp>
         <p:nvCxnSpPr>
-          <p:cNvPr id="181" name="Connecteur droit 180"/>
+          <p:cNvPr id="186" name="Connecteur droit 185"/>
           <p:cNvCxnSpPr/>
           <p:nvPr/>
         </p:nvCxnSpPr>
         <p:spPr>
-          <a:xfrm rot="5400000">
-            <a:off x="1089603" y="4602901"/>
-            <a:ext cx="215902" cy="11240"/>
-          </a:xfrm>
-          <a:prstGeom prst="line">
-            <a:avLst/>
-          </a:prstGeom>
-          <a:noFill/>
-          <a:ln w="28575" cap="flat" cmpd="sng" algn="ctr">
-            <a:solidFill>
-              <a:srgbClr val="C0504D">
-                <a:shade val="95000"/>
-                <a:satMod val="105000"/>
-              </a:srgbClr>
-            </a:solidFill>
-            <a:prstDash val="solid"/>
-            <a:headEnd type="none" w="med" len="med"/>
-            <a:tailEnd type="arrow" w="med" len="med"/>
-          </a:ln>
-          <a:effectLst/>
-        </p:spPr>
-      </p:cxnSp>
-      <p:cxnSp>
-        <p:nvCxnSpPr>
-          <p:cNvPr id="183" name="Connecteur droit 182"/>
-          <p:cNvCxnSpPr/>
-          <p:nvPr/>
-        </p:nvCxnSpPr>
-        <p:spPr>
-          <a:xfrm>
-            <a:off x="1203174" y="4500570"/>
-            <a:ext cx="3571900" cy="1588"/>
-          </a:xfrm>
-          <a:prstGeom prst="line">
-            <a:avLst/>
-          </a:prstGeom>
-          <a:noFill/>
-          <a:ln w="28575" cap="flat" cmpd="sng" algn="ctr">
-            <a:solidFill>
-              <a:srgbClr val="C0504D">
-                <a:shade val="95000"/>
-                <a:satMod val="105000"/>
-              </a:srgbClr>
-            </a:solidFill>
-            <a:prstDash val="solid"/>
-            <a:headEnd type="none" w="med" len="med"/>
-            <a:tailEnd type="none" w="med" len="med"/>
-          </a:ln>
-          <a:effectLst/>
-        </p:spPr>
-      </p:cxnSp>
-      <p:cxnSp>
-        <p:nvCxnSpPr>
-          <p:cNvPr id="186" name="Connecteur droit 185"/>
-          <p:cNvCxnSpPr>
-            <a:endCxn id="57" idx="2"/>
-          </p:cNvCxnSpPr>
-          <p:nvPr/>
-        </p:nvCxnSpPr>
-        <p:spPr>
-          <a:xfrm rot="5400000" flipH="1" flipV="1">
-            <a:off x="4708694" y="4428570"/>
-            <a:ext cx="138380" cy="5620"/>
+          <a:xfrm rot="16200000" flipV="1">
+            <a:off x="4970047" y="4678603"/>
+            <a:ext cx="638446" cy="5620"/>
           </a:xfrm>
           <a:prstGeom prst="line">
             <a:avLst/>
@@ -6812,15 +6814,13 @@
       <p:cxnSp>
         <p:nvCxnSpPr>
           <p:cNvPr id="189" name="Connecteur droit 188"/>
-          <p:cNvCxnSpPr>
-            <a:stCxn id="162" idx="3"/>
-          </p:cNvCxnSpPr>
+          <p:cNvCxnSpPr/>
           <p:nvPr/>
         </p:nvCxnSpPr>
         <p:spPr>
-          <a:xfrm flipV="1">
-            <a:off x="1928794" y="5002224"/>
-            <a:ext cx="4071966" cy="660"/>
+          <a:xfrm>
+            <a:off x="5292080" y="5000636"/>
+            <a:ext cx="708680" cy="1588"/>
           </a:xfrm>
           <a:prstGeom prst="line">
             <a:avLst/>
@@ -6956,6 +6956,2059 @@
         <p:spPr>
           <a:xfrm>
             <a:off x="6643702" y="5643578"/>
+            <a:ext cx="1895071" cy="307777"/>
+          </a:xfrm>
+          <a:prstGeom prst="rect">
+            <a:avLst/>
+          </a:prstGeom>
+        </p:spPr>
+        <p:txBody>
+          <a:bodyPr wrap="none">
+            <a:spAutoFit/>
+          </a:bodyPr>
+          <a:lstStyle/>
+          <a:p>
+            <a:r>
+              <a:rPr lang="fr-FR" sz="1400" b="1" kern="0" dirty="0">
+                <a:solidFill>
+                  <a:prstClr val="black"/>
+                </a:solidFill>
+              </a:rPr>
+              <a:t>Tête en </a:t>
+            </a:r>
+            <a:r>
+              <a:rPr lang="fr-FR" sz="1400" b="1" kern="0" dirty="0" smtClean="0">
+                <a:solidFill>
+                  <a:prstClr val="black"/>
+                </a:solidFill>
+              </a:rPr>
+              <a:t>bas (</a:t>
+            </a:r>
+            <a:r>
+              <a:rPr lang="fr-FR" sz="1400" b="1" kern="0" dirty="0" err="1" smtClean="0">
+                <a:solidFill>
+                  <a:prstClr val="black"/>
+                </a:solidFill>
+              </a:rPr>
+              <a:t>resp</a:t>
+            </a:r>
+            <a:r>
+              <a:rPr lang="fr-FR" sz="1400" b="1" kern="0" dirty="0" smtClean="0">
+                <a:solidFill>
+                  <a:prstClr val="black"/>
+                </a:solidFill>
+              </a:rPr>
+              <a:t> haut)</a:t>
+            </a:r>
+            <a:endParaRPr lang="fr-FR" sz="1400" b="1" dirty="0"/>
+          </a:p>
+        </p:txBody>
+      </p:sp>
+      <p:cxnSp>
+        <p:nvCxnSpPr>
+          <p:cNvPr id="223" name="Connecteur droit avec flèche 222"/>
+          <p:cNvCxnSpPr/>
+          <p:nvPr/>
+        </p:nvCxnSpPr>
+        <p:spPr>
+          <a:xfrm>
+            <a:off x="357158" y="-714404"/>
+            <a:ext cx="6581064" cy="1588"/>
+          </a:xfrm>
+          <a:prstGeom prst="straightConnector1">
+            <a:avLst/>
+          </a:prstGeom>
+          <a:noFill/>
+          <a:ln w="19050" cap="flat" cmpd="sng" algn="ctr">
+            <a:solidFill>
+              <a:srgbClr val="4F81BD">
+                <a:shade val="95000"/>
+                <a:satMod val="105000"/>
+              </a:srgbClr>
+            </a:solidFill>
+            <a:prstDash val="solid"/>
+            <a:headEnd type="none" w="med" len="med"/>
+            <a:tailEnd type="none" w="med" len="med"/>
+          </a:ln>
+          <a:effectLst/>
+        </p:spPr>
+      </p:cxnSp>
+      <p:cxnSp>
+        <p:nvCxnSpPr>
+          <p:cNvPr id="225" name="Connecteur droit avec flèche 224"/>
+          <p:cNvCxnSpPr/>
+          <p:nvPr/>
+        </p:nvCxnSpPr>
+        <p:spPr>
+          <a:xfrm>
+            <a:off x="428596" y="-642966"/>
+            <a:ext cx="6438188" cy="1588"/>
+          </a:xfrm>
+          <a:prstGeom prst="straightConnector1">
+            <a:avLst/>
+          </a:prstGeom>
+          <a:noFill/>
+          <a:ln w="19050" cap="flat" cmpd="sng" algn="ctr">
+            <a:solidFill>
+              <a:srgbClr val="4F81BD">
+                <a:shade val="95000"/>
+                <a:satMod val="105000"/>
+              </a:srgbClr>
+            </a:solidFill>
+            <a:prstDash val="solid"/>
+            <a:headEnd type="none" w="med" len="med"/>
+            <a:tailEnd type="none" w="med" len="med"/>
+          </a:ln>
+          <a:effectLst/>
+        </p:spPr>
+      </p:cxnSp>
+      <p:cxnSp>
+        <p:nvCxnSpPr>
+          <p:cNvPr id="241" name="Connecteur droit avec flèche 240"/>
+          <p:cNvCxnSpPr/>
+          <p:nvPr/>
+        </p:nvCxnSpPr>
+        <p:spPr>
+          <a:xfrm flipV="1">
+            <a:off x="4356770" y="3228367"/>
+            <a:ext cx="0" cy="558617"/>
+          </a:xfrm>
+          <a:prstGeom prst="straightConnector1">
+            <a:avLst/>
+          </a:prstGeom>
+          <a:noFill/>
+          <a:ln w="19050" cap="flat" cmpd="sng" algn="ctr">
+            <a:solidFill>
+              <a:srgbClr val="4F81BD">
+                <a:shade val="95000"/>
+                <a:satMod val="105000"/>
+              </a:srgbClr>
+            </a:solidFill>
+            <a:prstDash val="solid"/>
+            <a:headEnd type="none" w="med" len="med"/>
+            <a:tailEnd type="none" w="med" len="med"/>
+          </a:ln>
+          <a:effectLst/>
+        </p:spPr>
+      </p:cxnSp>
+      <p:cxnSp>
+        <p:nvCxnSpPr>
+          <p:cNvPr id="251" name="Connecteur droit avec flèche 250"/>
+          <p:cNvCxnSpPr/>
+          <p:nvPr/>
+        </p:nvCxnSpPr>
+        <p:spPr>
+          <a:xfrm flipH="1" flipV="1">
+            <a:off x="357158" y="3214686"/>
+            <a:ext cx="3999612" cy="1589"/>
+          </a:xfrm>
+          <a:prstGeom prst="straightConnector1">
+            <a:avLst/>
+          </a:prstGeom>
+          <a:noFill/>
+          <a:ln w="19050" cap="flat" cmpd="sng" algn="ctr">
+            <a:solidFill>
+              <a:srgbClr val="4F81BD">
+                <a:shade val="95000"/>
+                <a:satMod val="105000"/>
+              </a:srgbClr>
+            </a:solidFill>
+            <a:prstDash val="solid"/>
+            <a:headEnd type="none" w="med" len="med"/>
+            <a:tailEnd type="none" w="med" len="med"/>
+          </a:ln>
+          <a:effectLst/>
+        </p:spPr>
+      </p:cxnSp>
+      <p:cxnSp>
+        <p:nvCxnSpPr>
+          <p:cNvPr id="280" name="Connecteur droit avec flèche 279"/>
+          <p:cNvCxnSpPr/>
+          <p:nvPr/>
+        </p:nvCxnSpPr>
+        <p:spPr>
+          <a:xfrm rot="5400000" flipH="1" flipV="1">
+            <a:off x="-32" y="2857496"/>
+            <a:ext cx="714380" cy="1588"/>
+          </a:xfrm>
+          <a:prstGeom prst="straightConnector1">
+            <a:avLst/>
+          </a:prstGeom>
+          <a:noFill/>
+          <a:ln w="19050" cap="flat" cmpd="sng" algn="ctr">
+            <a:solidFill>
+              <a:srgbClr val="4F81BD">
+                <a:shade val="95000"/>
+                <a:satMod val="105000"/>
+              </a:srgbClr>
+            </a:solidFill>
+            <a:prstDash val="solid"/>
+            <a:headEnd type="none" w="med" len="med"/>
+            <a:tailEnd type="none" w="med" len="med"/>
+          </a:ln>
+          <a:effectLst/>
+        </p:spPr>
+      </p:cxnSp>
+      <p:cxnSp>
+        <p:nvCxnSpPr>
+          <p:cNvPr id="282" name="Connecteur droit avec flèche 281"/>
+          <p:cNvCxnSpPr/>
+          <p:nvPr/>
+        </p:nvCxnSpPr>
+        <p:spPr>
+          <a:xfrm>
+            <a:off x="357158" y="2500306"/>
+            <a:ext cx="357190" cy="1588"/>
+          </a:xfrm>
+          <a:prstGeom prst="straightConnector1">
+            <a:avLst/>
+          </a:prstGeom>
+          <a:noFill/>
+          <a:ln w="19050" cap="flat" cmpd="sng" algn="ctr">
+            <a:solidFill>
+              <a:srgbClr val="4F81BD">
+                <a:shade val="95000"/>
+                <a:satMod val="105000"/>
+              </a:srgbClr>
+            </a:solidFill>
+            <a:prstDash val="solid"/>
+            <a:tailEnd type="arrow"/>
+          </a:ln>
+          <a:effectLst/>
+        </p:spPr>
+      </p:cxnSp>
+      <p:sp>
+        <p:nvSpPr>
+          <p:cNvPr id="210" name="Rectangle 209"/>
+          <p:cNvSpPr/>
+          <p:nvPr/>
+        </p:nvSpPr>
+        <p:spPr>
+          <a:xfrm rot="16200000">
+            <a:off x="-753571" y="3171428"/>
+            <a:ext cx="1507144" cy="307777"/>
+          </a:xfrm>
+          <a:prstGeom prst="rect">
+            <a:avLst/>
+          </a:prstGeom>
+        </p:spPr>
+        <p:txBody>
+          <a:bodyPr wrap="none">
+            <a:spAutoFit/>
+          </a:bodyPr>
+          <a:lstStyle/>
+          <a:p>
+            <a:r>
+              <a:rPr lang="fr-FR" sz="1400" b="1" i="1" dirty="0" smtClean="0">
+                <a:solidFill>
+                  <a:schemeClr val="accent2"/>
+                </a:solidFill>
+              </a:rPr>
+              <a:t>Électricité  ~230 V</a:t>
+            </a:r>
+            <a:endParaRPr lang="fr-FR" sz="1400" b="1" i="1" dirty="0">
+              <a:solidFill>
+                <a:schemeClr val="accent2"/>
+              </a:solidFill>
+            </a:endParaRPr>
+          </a:p>
+        </p:txBody>
+      </p:sp>
+      <p:cxnSp>
+        <p:nvCxnSpPr>
+          <p:cNvPr id="287" name="Connecteur droit avec flèche 286"/>
+          <p:cNvCxnSpPr/>
+          <p:nvPr/>
+        </p:nvCxnSpPr>
+        <p:spPr>
+          <a:xfrm rot="5400000">
+            <a:off x="2642380" y="3286124"/>
+            <a:ext cx="1000926" cy="794"/>
+          </a:xfrm>
+          <a:prstGeom prst="straightConnector1">
+            <a:avLst/>
+          </a:prstGeom>
+          <a:noFill/>
+          <a:ln w="28575" cap="flat" cmpd="sng" algn="ctr">
+            <a:solidFill>
+              <a:srgbClr val="4F81BD">
+                <a:shade val="95000"/>
+                <a:satMod val="105000"/>
+              </a:srgbClr>
+            </a:solidFill>
+            <a:prstDash val="solid"/>
+            <a:tailEnd type="arrow"/>
+          </a:ln>
+          <a:effectLst/>
+        </p:spPr>
+      </p:cxnSp>
+      <p:sp>
+        <p:nvSpPr>
+          <p:cNvPr id="206" name="Rectangle 205"/>
+          <p:cNvSpPr/>
+          <p:nvPr/>
+        </p:nvSpPr>
+        <p:spPr>
+          <a:xfrm>
+            <a:off x="6715140" y="3214686"/>
+            <a:ext cx="1895071" cy="307777"/>
+          </a:xfrm>
+          <a:prstGeom prst="rect">
+            <a:avLst/>
+          </a:prstGeom>
+        </p:spPr>
+        <p:txBody>
+          <a:bodyPr wrap="none">
+            <a:spAutoFit/>
+          </a:bodyPr>
+          <a:lstStyle/>
+          <a:p>
+            <a:r>
+              <a:rPr lang="fr-FR" sz="1400" b="1" kern="0" dirty="0" smtClean="0">
+                <a:solidFill>
+                  <a:prstClr val="black"/>
+                </a:solidFill>
+              </a:rPr>
+              <a:t>Tête en haut (</a:t>
+            </a:r>
+            <a:r>
+              <a:rPr lang="fr-FR" sz="1400" b="1" kern="0" dirty="0" err="1" smtClean="0">
+                <a:solidFill>
+                  <a:prstClr val="black"/>
+                </a:solidFill>
+              </a:rPr>
+              <a:t>resp</a:t>
+            </a:r>
+            <a:r>
+              <a:rPr lang="fr-FR" sz="1400" b="1" kern="0" dirty="0" smtClean="0">
+                <a:solidFill>
+                  <a:prstClr val="black"/>
+                </a:solidFill>
+              </a:rPr>
+              <a:t> bas)</a:t>
+            </a:r>
+            <a:endParaRPr lang="fr-FR" sz="1400" b="1" dirty="0"/>
+          </a:p>
+        </p:txBody>
+      </p:sp>
+      <p:cxnSp>
+        <p:nvCxnSpPr>
+          <p:cNvPr id="73" name="Connecteur droit avec flèche 72"/>
+          <p:cNvCxnSpPr>
+            <a:stCxn id="65" idx="3"/>
+            <a:endCxn id="140" idx="1"/>
+          </p:cNvCxnSpPr>
+          <p:nvPr/>
+        </p:nvCxnSpPr>
+        <p:spPr>
+          <a:xfrm flipV="1">
+            <a:off x="4154612" y="2498058"/>
+            <a:ext cx="774578" cy="4496"/>
+          </a:xfrm>
+          <a:prstGeom prst="straightConnector1">
+            <a:avLst/>
+          </a:prstGeom>
+          <a:solidFill>
+            <a:schemeClr val="accent1">
+              <a:lumMod val="20000"/>
+              <a:lumOff val="80000"/>
+            </a:schemeClr>
+          </a:solidFill>
+          <a:ln w="28575" cap="flat" cmpd="sng" algn="ctr">
+            <a:solidFill>
+              <a:srgbClr val="4F81BD">
+                <a:shade val="95000"/>
+                <a:satMod val="105000"/>
+              </a:srgbClr>
+            </a:solidFill>
+            <a:prstDash val="solid"/>
+            <a:headEnd type="arrow"/>
+            <a:tailEnd type="arrow"/>
+          </a:ln>
+          <a:effectLst/>
+        </p:spPr>
+      </p:cxnSp>
+      <p:pic>
+        <p:nvPicPr>
+          <p:cNvPr id="36" name="Picture 5"/>
+          <p:cNvPicPr>
+            <a:picLocks noChangeAspect="1" noChangeArrowheads="1"/>
+          </p:cNvPicPr>
+          <p:nvPr/>
+        </p:nvPicPr>
+        <p:blipFill>
+          <a:blip r:embed="rId3" cstate="print"/>
+          <a:srcRect/>
+          <a:stretch>
+            <a:fillRect/>
+          </a:stretch>
+        </p:blipFill>
+        <p:spPr bwMode="auto">
+          <a:xfrm>
+            <a:off x="2898827" y="589470"/>
+            <a:ext cx="1071570" cy="1002911"/>
+          </a:xfrm>
+          <a:prstGeom prst="rect">
+            <a:avLst/>
+          </a:prstGeom>
+          <a:noFill/>
+          <a:ln w="9525">
+            <a:noFill/>
+            <a:miter lim="800000"/>
+            <a:headEnd/>
+            <a:tailEnd/>
+          </a:ln>
+          <a:effectLst/>
+        </p:spPr>
+      </p:pic>
+      <p:pic>
+        <p:nvPicPr>
+          <p:cNvPr id="1026" name="Picture 2"/>
+          <p:cNvPicPr>
+            <a:picLocks noChangeAspect="1" noChangeArrowheads="1"/>
+          </p:cNvPicPr>
+          <p:nvPr/>
+        </p:nvPicPr>
+        <p:blipFill>
+          <a:blip r:embed="rId4" cstate="print">
+            <a:extLst>
+              <a:ext uri="{28A0092B-C50C-407E-A947-70E740481C1C}">
+                <a14:useLocalDpi xmlns:a14="http://schemas.microsoft.com/office/drawing/2010/main" val="0"/>
+              </a:ext>
+            </a:extLst>
+          </a:blip>
+          <a:srcRect/>
+          <a:stretch>
+            <a:fillRect/>
+          </a:stretch>
+        </p:blipFill>
+        <p:spPr bwMode="auto">
+          <a:xfrm>
+            <a:off x="4331593" y="4412874"/>
+            <a:ext cx="526221" cy="1135970"/>
+          </a:xfrm>
+          <a:prstGeom prst="rect">
+            <a:avLst/>
+          </a:prstGeom>
+          <a:noFill/>
+          <a:ln>
+            <a:noFill/>
+          </a:ln>
+          <a:effectLst/>
+          <a:extLst>
+            <a:ext uri="{909E8E84-426E-40DD-AFC4-6F175D3DCCD1}">
+              <a14:hiddenFill xmlns:a14="http://schemas.microsoft.com/office/drawing/2010/main">
+                <a:solidFill>
+                  <a:schemeClr val="accent1"/>
+                </a:solidFill>
+              </a14:hiddenFill>
+            </a:ext>
+            <a:ext uri="{91240B29-F687-4F45-9708-019B960494DF}">
+              <a14:hiddenLine xmlns:a14="http://schemas.microsoft.com/office/drawing/2010/main" w="9525">
+                <a:solidFill>
+                  <a:schemeClr val="tx1"/>
+                </a:solidFill>
+                <a:miter lim="800000"/>
+                <a:headEnd/>
+                <a:tailEnd/>
+              </a14:hiddenLine>
+            </a:ext>
+            <a:ext uri="{AF507438-7753-43E0-B8FC-AC1667EBCBE1}">
+              <a14:hiddenEffects xmlns:a14="http://schemas.microsoft.com/office/drawing/2010/main">
+                <a:effectLst>
+                  <a:outerShdw dist="35921" dir="2700000" algn="ctr" rotWithShape="0">
+                    <a:schemeClr val="bg2"/>
+                  </a:outerShdw>
+                </a:effectLst>
+              </a14:hiddenEffects>
+            </a:ext>
+          </a:extLst>
+        </p:spPr>
+      </p:pic>
+      <p:pic>
+        <p:nvPicPr>
+          <p:cNvPr id="1027" name="Picture 3"/>
+          <p:cNvPicPr>
+            <a:picLocks noChangeAspect="1" noChangeArrowheads="1"/>
+          </p:cNvPicPr>
+          <p:nvPr/>
+        </p:nvPicPr>
+        <p:blipFill>
+          <a:blip r:embed="rId5" cstate="print">
+            <a:extLst>
+              <a:ext uri="{28A0092B-C50C-407E-A947-70E740481C1C}">
+                <a14:useLocalDpi xmlns:a14="http://schemas.microsoft.com/office/drawing/2010/main" val="0"/>
+              </a:ext>
+            </a:extLst>
+          </a:blip>
+          <a:srcRect/>
+          <a:stretch>
+            <a:fillRect/>
+          </a:stretch>
+        </p:blipFill>
+        <p:spPr bwMode="auto">
+          <a:xfrm>
+            <a:off x="2424750" y="4412874"/>
+            <a:ext cx="1228313" cy="1106445"/>
+          </a:xfrm>
+          <a:prstGeom prst="rect">
+            <a:avLst/>
+          </a:prstGeom>
+          <a:noFill/>
+          <a:ln>
+            <a:noFill/>
+          </a:ln>
+          <a:effectLst/>
+          <a:extLst>
+            <a:ext uri="{909E8E84-426E-40DD-AFC4-6F175D3DCCD1}">
+              <a14:hiddenFill xmlns:a14="http://schemas.microsoft.com/office/drawing/2010/main">
+                <a:solidFill>
+                  <a:schemeClr val="accent1"/>
+                </a:solidFill>
+              </a14:hiddenFill>
+            </a:ext>
+            <a:ext uri="{91240B29-F687-4F45-9708-019B960494DF}">
+              <a14:hiddenLine xmlns:a14="http://schemas.microsoft.com/office/drawing/2010/main" w="9525">
+                <a:solidFill>
+                  <a:schemeClr val="tx1"/>
+                </a:solidFill>
+                <a:miter lim="800000"/>
+                <a:headEnd/>
+                <a:tailEnd/>
+              </a14:hiddenLine>
+            </a:ext>
+            <a:ext uri="{AF507438-7753-43E0-B8FC-AC1667EBCBE1}">
+              <a14:hiddenEffects xmlns:a14="http://schemas.microsoft.com/office/drawing/2010/main">
+                <a:effectLst>
+                  <a:outerShdw dist="35921" dir="2700000" algn="ctr" rotWithShape="0">
+                    <a:schemeClr val="bg2"/>
+                  </a:outerShdw>
+                </a:effectLst>
+              </a14:hiddenEffects>
+            </a:ext>
+          </a:extLst>
+        </p:spPr>
+      </p:pic>
+    </p:spTree>
+    <p:extLst>
+      <p:ext uri="{BB962C8B-B14F-4D97-AF65-F5344CB8AC3E}">
+        <p14:creationId xmlns:p14="http://schemas.microsoft.com/office/powerpoint/2010/main" val="3420885180"/>
+      </p:ext>
+    </p:extLst>
+  </p:cSld>
+  <p:clrMapOvr>
+    <a:masterClrMapping/>
+  </p:clrMapOvr>
+</p:sld>
+</file>
+
+<file path=ppt/slides/slide3.xml><?xml version="1.0" encoding="utf-8"?>
+<p:sld xmlns:a="http://schemas.openxmlformats.org/drawingml/2006/main" xmlns:r="http://schemas.openxmlformats.org/officeDocument/2006/relationships" xmlns:p="http://schemas.openxmlformats.org/presentationml/2006/main">
+  <p:cSld>
+    <p:spTree>
+      <p:nvGrpSpPr>
+        <p:cNvPr id="1" name=""/>
+        <p:cNvGrpSpPr/>
+        <p:nvPr/>
+      </p:nvGrpSpPr>
+      <p:grpSpPr>
+        <a:xfrm>
+          <a:off x="0" y="0"/>
+          <a:ext cx="0" cy="0"/>
+          <a:chOff x="0" y="0"/>
+          <a:chExt cx="0" cy="0"/>
+        </a:xfrm>
+      </p:grpSpPr>
+      <p:sp>
+        <p:nvSpPr>
+          <p:cNvPr id="40" name="Rectangle à coins arrondis 39"/>
+          <p:cNvSpPr/>
+          <p:nvPr/>
+        </p:nvSpPr>
+        <p:spPr>
+          <a:xfrm>
+            <a:off x="357158" y="3571876"/>
+            <a:ext cx="7358114" cy="2000264"/>
+          </a:xfrm>
+          <a:prstGeom prst="roundRect">
+            <a:avLst>
+              <a:gd name="adj" fmla="val 8149"/>
+            </a:avLst>
+          </a:prstGeom>
+          <a:solidFill>
+            <a:schemeClr val="accent2">
+              <a:lumMod val="20000"/>
+              <a:lumOff val="80000"/>
+            </a:schemeClr>
+          </a:solidFill>
+          <a:ln w="25400" cap="flat" cmpd="sng" algn="ctr">
+            <a:solidFill>
+              <a:srgbClr val="C0504D"/>
+            </a:solidFill>
+            <a:prstDash val="solid"/>
+          </a:ln>
+          <a:effectLst/>
+        </p:spPr>
+        <p:txBody>
+          <a:bodyPr rtlCol="0" anchor="b"/>
+          <a:lstStyle/>
+          <a:p>
+            <a:pPr marL="0" marR="0" lvl="0" indent="0" algn="ctr" defTabSz="914400" eaLnBrk="1" fontAlgn="auto" latinLnBrk="0" hangingPunct="1">
+              <a:lnSpc>
+                <a:spcPct val="100000"/>
+              </a:lnSpc>
+              <a:spcBef>
+                <a:spcPts val="0"/>
+              </a:spcBef>
+              <a:spcAft>
+                <a:spcPts val="0"/>
+              </a:spcAft>
+              <a:buClrTx/>
+              <a:buSzTx/>
+              <a:buFontTx/>
+              <a:buNone/>
+              <a:tabLst/>
+              <a:defRPr/>
+            </a:pPr>
+            <a:r>
+              <a:rPr kumimoji="0" lang="fr-FR" sz="1400" b="0" i="1" u="none" strike="noStrike" kern="0" cap="none" spc="0" normalizeH="0" baseline="0" noProof="0" dirty="0" smtClean="0">
+                <a:ln>
+                  <a:noFill/>
+                </a:ln>
+                <a:solidFill>
+                  <a:prstClr val="black"/>
+                </a:solidFill>
+                <a:effectLst/>
+                <a:uLnTx/>
+                <a:uFillTx/>
+                <a:latin typeface="Calibri"/>
+                <a:ea typeface="+mn-ea"/>
+                <a:cs typeface="+mn-cs"/>
+              </a:rPr>
+              <a:t>Chaîne d’énergie</a:t>
+            </a:r>
+          </a:p>
+        </p:txBody>
+      </p:sp>
+      <p:sp>
+        <p:nvSpPr>
+          <p:cNvPr id="42" name="Rectangle 41"/>
+          <p:cNvSpPr/>
+          <p:nvPr/>
+        </p:nvSpPr>
+        <p:spPr>
+          <a:xfrm>
+            <a:off x="500034" y="3786190"/>
+            <a:ext cx="1440000" cy="576000"/>
+          </a:xfrm>
+          <a:prstGeom prst="rect">
+            <a:avLst/>
+          </a:prstGeom>
+          <a:solidFill>
+            <a:schemeClr val="accent2">
+              <a:lumMod val="40000"/>
+              <a:lumOff val="60000"/>
+            </a:schemeClr>
+          </a:solidFill>
+          <a:ln w="9525" cap="flat" cmpd="sng" algn="ctr">
+            <a:solidFill>
+              <a:srgbClr val="C0504D">
+                <a:shade val="95000"/>
+                <a:satMod val="105000"/>
+              </a:srgbClr>
+            </a:solidFill>
+            <a:prstDash val="solid"/>
+          </a:ln>
+          <a:effectLst>
+            <a:outerShdw blurRad="40000" dist="20000" dir="5400000" rotWithShape="0">
+              <a:srgbClr val="000000">
+                <a:alpha val="38000"/>
+              </a:srgbClr>
+            </a:outerShdw>
+          </a:effectLst>
+        </p:spPr>
+        <p:txBody>
+          <a:bodyPr rtlCol="0" anchor="t"/>
+          <a:lstStyle/>
+          <a:p>
+            <a:pPr algn="ctr">
+              <a:defRPr/>
+            </a:pPr>
+            <a:r>
+              <a:rPr lang="fr-FR" sz="1200" b="1" kern="0" dirty="0" smtClean="0">
+                <a:solidFill>
+                  <a:prstClr val="black"/>
+                </a:solidFill>
+                <a:latin typeface="Calibri"/>
+              </a:rPr>
+              <a:t>ALIMENTER</a:t>
+            </a:r>
+          </a:p>
+          <a:p>
+            <a:pPr algn="ctr">
+              <a:defRPr/>
+            </a:pPr>
+            <a:r>
+              <a:rPr lang="fr-FR" sz="1200" kern="0" dirty="0" smtClean="0">
+                <a:solidFill>
+                  <a:prstClr val="black"/>
+                </a:solidFill>
+                <a:latin typeface="Calibri"/>
+              </a:rPr>
+              <a:t>Transformateur</a:t>
+            </a:r>
+          </a:p>
+        </p:txBody>
+      </p:sp>
+      <p:sp>
+        <p:nvSpPr>
+          <p:cNvPr id="55" name="Rectangle 54"/>
+          <p:cNvSpPr/>
+          <p:nvPr/>
+        </p:nvSpPr>
+        <p:spPr>
+          <a:xfrm>
+            <a:off x="2274744" y="3786190"/>
+            <a:ext cx="1440000" cy="576000"/>
+          </a:xfrm>
+          <a:prstGeom prst="rect">
+            <a:avLst/>
+          </a:prstGeom>
+          <a:solidFill>
+            <a:schemeClr val="accent2">
+              <a:lumMod val="40000"/>
+              <a:lumOff val="60000"/>
+            </a:schemeClr>
+          </a:solidFill>
+          <a:ln w="9525" cap="flat" cmpd="sng" algn="ctr">
+            <a:solidFill>
+              <a:srgbClr val="C0504D">
+                <a:shade val="95000"/>
+                <a:satMod val="105000"/>
+              </a:srgbClr>
+            </a:solidFill>
+            <a:prstDash val="solid"/>
+          </a:ln>
+          <a:effectLst>
+            <a:outerShdw blurRad="40000" dist="20000" dir="5400000" rotWithShape="0">
+              <a:srgbClr val="000000">
+                <a:alpha val="38000"/>
+              </a:srgbClr>
+            </a:outerShdw>
+          </a:effectLst>
+        </p:spPr>
+        <p:txBody>
+          <a:bodyPr rtlCol="0" anchor="t"/>
+          <a:lstStyle/>
+          <a:p>
+            <a:pPr algn="ctr">
+              <a:defRPr/>
+            </a:pPr>
+            <a:r>
+              <a:rPr lang="fr-FR" sz="1200" b="1" kern="0" dirty="0" smtClean="0">
+                <a:solidFill>
+                  <a:prstClr val="black"/>
+                </a:solidFill>
+                <a:latin typeface="Calibri"/>
+              </a:rPr>
+              <a:t>MODULER</a:t>
+            </a:r>
+          </a:p>
+          <a:p>
+            <a:pPr algn="ctr">
+              <a:defRPr/>
+            </a:pPr>
+            <a:r>
+              <a:rPr lang="fr-FR" sz="1200" kern="0" dirty="0" smtClean="0">
+                <a:solidFill>
+                  <a:prstClr val="black"/>
+                </a:solidFill>
+              </a:rPr>
+              <a:t>Automate</a:t>
+            </a:r>
+          </a:p>
+        </p:txBody>
+      </p:sp>
+      <p:cxnSp>
+        <p:nvCxnSpPr>
+          <p:cNvPr id="56" name="Connecteur droit 55"/>
+          <p:cNvCxnSpPr>
+            <a:stCxn id="42" idx="3"/>
+            <a:endCxn id="55" idx="1"/>
+          </p:cNvCxnSpPr>
+          <p:nvPr/>
+        </p:nvCxnSpPr>
+        <p:spPr>
+          <a:xfrm>
+            <a:off x="1940034" y="4074190"/>
+            <a:ext cx="334710" cy="1588"/>
+          </a:xfrm>
+          <a:prstGeom prst="line">
+            <a:avLst/>
+          </a:prstGeom>
+          <a:noFill/>
+          <a:ln w="28575" cap="flat" cmpd="sng" algn="ctr">
+            <a:solidFill>
+              <a:srgbClr val="C0504D">
+                <a:shade val="95000"/>
+                <a:satMod val="105000"/>
+              </a:srgbClr>
+            </a:solidFill>
+            <a:prstDash val="solid"/>
+            <a:headEnd type="none" w="med" len="med"/>
+            <a:tailEnd type="arrow" w="med" len="med"/>
+          </a:ln>
+          <a:effectLst/>
+        </p:spPr>
+      </p:cxnSp>
+      <p:sp>
+        <p:nvSpPr>
+          <p:cNvPr id="57" name="Rectangle 56"/>
+          <p:cNvSpPr/>
+          <p:nvPr/>
+        </p:nvSpPr>
+        <p:spPr>
+          <a:xfrm>
+            <a:off x="4060694" y="3786190"/>
+            <a:ext cx="1440000" cy="576000"/>
+          </a:xfrm>
+          <a:prstGeom prst="rect">
+            <a:avLst/>
+          </a:prstGeom>
+          <a:solidFill>
+            <a:schemeClr val="accent2">
+              <a:lumMod val="40000"/>
+              <a:lumOff val="60000"/>
+            </a:schemeClr>
+          </a:solidFill>
+          <a:ln w="9525" cap="flat" cmpd="sng" algn="ctr">
+            <a:solidFill>
+              <a:srgbClr val="C0504D">
+                <a:shade val="95000"/>
+                <a:satMod val="105000"/>
+              </a:srgbClr>
+            </a:solidFill>
+            <a:prstDash val="solid"/>
+          </a:ln>
+          <a:effectLst>
+            <a:outerShdw blurRad="40000" dist="20000" dir="5400000" rotWithShape="0">
+              <a:srgbClr val="000000">
+                <a:alpha val="38000"/>
+              </a:srgbClr>
+            </a:outerShdw>
+          </a:effectLst>
+        </p:spPr>
+        <p:txBody>
+          <a:bodyPr rtlCol="0" anchor="t"/>
+          <a:lstStyle/>
+          <a:p>
+            <a:pPr algn="ctr">
+              <a:defRPr/>
+            </a:pPr>
+            <a:r>
+              <a:rPr lang="fr-FR" sz="1200" b="1" kern="0" dirty="0" smtClean="0">
+                <a:solidFill>
+                  <a:prstClr val="black"/>
+                </a:solidFill>
+                <a:latin typeface="Calibri"/>
+              </a:rPr>
+              <a:t>CONVERTIR</a:t>
+            </a:r>
+          </a:p>
+          <a:p>
+            <a:pPr algn="ctr">
+              <a:defRPr/>
+            </a:pPr>
+            <a:r>
+              <a:rPr lang="fr-FR" sz="1200" kern="0" dirty="0" smtClean="0">
+                <a:solidFill>
+                  <a:prstClr val="black"/>
+                </a:solidFill>
+                <a:latin typeface="Calibri"/>
+              </a:rPr>
+              <a:t>Moteur à courant continu</a:t>
+            </a:r>
+          </a:p>
+        </p:txBody>
+      </p:sp>
+      <p:sp>
+        <p:nvSpPr>
+          <p:cNvPr id="58" name="Rectangle 57"/>
+          <p:cNvSpPr/>
+          <p:nvPr/>
+        </p:nvSpPr>
+        <p:spPr>
+          <a:xfrm>
+            <a:off x="6000760" y="4000504"/>
+            <a:ext cx="1071570" cy="1428760"/>
+          </a:xfrm>
+          <a:prstGeom prst="rect">
+            <a:avLst/>
+          </a:prstGeom>
+          <a:solidFill>
+            <a:schemeClr val="accent2">
+              <a:lumMod val="40000"/>
+              <a:lumOff val="60000"/>
+            </a:schemeClr>
+          </a:solidFill>
+          <a:ln w="9525" cap="flat" cmpd="sng" algn="ctr">
+            <a:solidFill>
+              <a:srgbClr val="C0504D">
+                <a:shade val="95000"/>
+                <a:satMod val="105000"/>
+              </a:srgbClr>
+            </a:solidFill>
+            <a:prstDash val="solid"/>
+          </a:ln>
+          <a:effectLst>
+            <a:outerShdw blurRad="40000" dist="20000" dir="5400000" rotWithShape="0">
+              <a:srgbClr val="000000">
+                <a:alpha val="38000"/>
+              </a:srgbClr>
+            </a:outerShdw>
+          </a:effectLst>
+        </p:spPr>
+        <p:txBody>
+          <a:bodyPr rtlCol="0" anchor="t"/>
+          <a:lstStyle/>
+          <a:p>
+            <a:pPr marR="0" lvl="0" indent="0" algn="ctr" fontAlgn="auto">
+              <a:lnSpc>
+                <a:spcPct val="100000"/>
+              </a:lnSpc>
+              <a:spcBef>
+                <a:spcPts val="0"/>
+              </a:spcBef>
+              <a:spcAft>
+                <a:spcPts val="0"/>
+              </a:spcAft>
+              <a:buClrTx/>
+              <a:buSzTx/>
+              <a:buFontTx/>
+              <a:buNone/>
+              <a:tabLst/>
+              <a:defRPr/>
+            </a:pPr>
+            <a:r>
+              <a:rPr lang="fr-FR" sz="1200" b="1" kern="0" dirty="0" smtClean="0">
+                <a:solidFill>
+                  <a:prstClr val="black"/>
+                </a:solidFill>
+                <a:latin typeface="Calibri"/>
+              </a:rPr>
+              <a:t>AGIR</a:t>
+            </a:r>
+          </a:p>
+          <a:p>
+            <a:pPr marR="0" lvl="0" indent="0" algn="ctr" fontAlgn="auto">
+              <a:lnSpc>
+                <a:spcPct val="100000"/>
+              </a:lnSpc>
+              <a:spcBef>
+                <a:spcPts val="0"/>
+              </a:spcBef>
+              <a:spcAft>
+                <a:spcPts val="0"/>
+              </a:spcAft>
+              <a:buClrTx/>
+              <a:buSzTx/>
+              <a:buFontTx/>
+              <a:buNone/>
+              <a:tabLst/>
+              <a:defRPr/>
+            </a:pPr>
+            <a:endParaRPr lang="fr-FR" sz="1200" b="1" kern="0" dirty="0" smtClean="0">
+              <a:solidFill>
+                <a:prstClr val="black"/>
+              </a:solidFill>
+              <a:latin typeface="Calibri"/>
+            </a:endParaRPr>
+          </a:p>
+          <a:p>
+            <a:pPr marR="0" lvl="0" indent="0" algn="ctr" fontAlgn="auto">
+              <a:lnSpc>
+                <a:spcPct val="100000"/>
+              </a:lnSpc>
+              <a:spcBef>
+                <a:spcPts val="0"/>
+              </a:spcBef>
+              <a:spcAft>
+                <a:spcPts val="0"/>
+              </a:spcAft>
+              <a:buClrTx/>
+              <a:buSzTx/>
+              <a:buFontTx/>
+              <a:buNone/>
+              <a:tabLst/>
+              <a:defRPr/>
+            </a:pPr>
+            <a:r>
+              <a:rPr lang="fr-FR" sz="1200" kern="0" dirty="0" smtClean="0">
+                <a:solidFill>
+                  <a:prstClr val="black"/>
+                </a:solidFill>
+                <a:latin typeface="Calibri"/>
+              </a:rPr>
+              <a:t>Tapis roulant</a:t>
+            </a:r>
+          </a:p>
+        </p:txBody>
+      </p:sp>
+      <p:sp>
+        <p:nvSpPr>
+          <p:cNvPr id="62" name="Rectangle à coins arrondis 61"/>
+          <p:cNvSpPr/>
+          <p:nvPr/>
+        </p:nvSpPr>
+        <p:spPr>
+          <a:xfrm>
+            <a:off x="428596" y="1643050"/>
+            <a:ext cx="6286545" cy="1357322"/>
+          </a:xfrm>
+          <a:prstGeom prst="roundRect">
+            <a:avLst>
+              <a:gd name="adj" fmla="val 4221"/>
+            </a:avLst>
+          </a:prstGeom>
+          <a:solidFill>
+            <a:schemeClr val="tx2">
+              <a:lumMod val="20000"/>
+              <a:lumOff val="80000"/>
+            </a:schemeClr>
+          </a:solidFill>
+          <a:ln w="25400" cap="flat" cmpd="sng" algn="ctr">
+            <a:solidFill>
+              <a:srgbClr val="4F81BD"/>
+            </a:solidFill>
+            <a:prstDash val="solid"/>
+          </a:ln>
+          <a:effectLst/>
+        </p:spPr>
+        <p:txBody>
+          <a:bodyPr rtlCol="0" anchor="t"/>
+          <a:lstStyle/>
+          <a:p>
+            <a:pPr marL="0" marR="0" lvl="0" indent="0" algn="ctr" defTabSz="914400" eaLnBrk="1" fontAlgn="auto" latinLnBrk="0" hangingPunct="1">
+              <a:lnSpc>
+                <a:spcPct val="100000"/>
+              </a:lnSpc>
+              <a:spcBef>
+                <a:spcPts val="0"/>
+              </a:spcBef>
+              <a:spcAft>
+                <a:spcPts val="0"/>
+              </a:spcAft>
+              <a:buClrTx/>
+              <a:buSzTx/>
+              <a:buFontTx/>
+              <a:buNone/>
+              <a:tabLst/>
+              <a:defRPr/>
+            </a:pPr>
+            <a:r>
+              <a:rPr kumimoji="0" lang="fr-FR" sz="1400" b="0" i="1" u="none" strike="noStrike" kern="0" cap="none" spc="0" normalizeH="0" baseline="0" noProof="0" dirty="0" smtClean="0">
+                <a:ln>
+                  <a:noFill/>
+                </a:ln>
+                <a:solidFill>
+                  <a:prstClr val="black"/>
+                </a:solidFill>
+                <a:effectLst/>
+                <a:uLnTx/>
+                <a:uFillTx/>
+                <a:latin typeface="Calibri"/>
+                <a:ea typeface="+mn-ea"/>
+                <a:cs typeface="+mn-cs"/>
+              </a:rPr>
+              <a:t>Chaîne d’information</a:t>
+            </a:r>
+          </a:p>
+        </p:txBody>
+      </p:sp>
+      <p:sp>
+        <p:nvSpPr>
+          <p:cNvPr id="65" name="Rectangle 64"/>
+          <p:cNvSpPr/>
+          <p:nvPr/>
+        </p:nvSpPr>
+        <p:spPr>
+          <a:xfrm>
+            <a:off x="2714612" y="2214554"/>
+            <a:ext cx="1440000" cy="576000"/>
+          </a:xfrm>
+          <a:prstGeom prst="rect">
+            <a:avLst/>
+          </a:prstGeom>
+          <a:solidFill>
+            <a:schemeClr val="tx2">
+              <a:lumMod val="40000"/>
+              <a:lumOff val="60000"/>
+            </a:schemeClr>
+          </a:solidFill>
+          <a:ln w="9525" cap="flat" cmpd="sng" algn="ctr">
+            <a:solidFill>
+              <a:srgbClr val="4F81BD">
+                <a:shade val="95000"/>
+                <a:satMod val="105000"/>
+              </a:srgbClr>
+            </a:solidFill>
+            <a:prstDash val="solid"/>
+          </a:ln>
+          <a:effectLst>
+            <a:outerShdw blurRad="40000" dist="20000" dir="5400000" rotWithShape="0">
+              <a:srgbClr val="000000">
+                <a:alpha val="38000"/>
+              </a:srgbClr>
+            </a:outerShdw>
+          </a:effectLst>
+        </p:spPr>
+        <p:txBody>
+          <a:bodyPr rtlCol="0" anchor="t"/>
+          <a:lstStyle/>
+          <a:p>
+            <a:pPr marL="0" marR="0" lvl="0" indent="0" algn="ctr" defTabSz="914400" eaLnBrk="1" fontAlgn="auto" latinLnBrk="0" hangingPunct="1">
+              <a:lnSpc>
+                <a:spcPct val="100000"/>
+              </a:lnSpc>
+              <a:spcBef>
+                <a:spcPts val="0"/>
+              </a:spcBef>
+              <a:spcAft>
+                <a:spcPts val="0"/>
+              </a:spcAft>
+              <a:buClrTx/>
+              <a:buSzTx/>
+              <a:buFontTx/>
+              <a:buNone/>
+              <a:tabLst/>
+              <a:defRPr/>
+            </a:pPr>
+            <a:r>
+              <a:rPr kumimoji="0" lang="fr-FR" sz="1000" b="1" i="0" u="none" strike="noStrike" kern="0" cap="none" spc="0" normalizeH="0" baseline="0" noProof="0" dirty="0" smtClean="0">
+                <a:ln>
+                  <a:noFill/>
+                </a:ln>
+                <a:solidFill>
+                  <a:prstClr val="black"/>
+                </a:solidFill>
+                <a:effectLst/>
+                <a:uLnTx/>
+                <a:uFillTx/>
+                <a:latin typeface="Calibri"/>
+                <a:ea typeface="+mn-ea"/>
+                <a:cs typeface="+mn-cs"/>
+              </a:rPr>
+              <a:t>TRAITER – </a:t>
+            </a:r>
+            <a:r>
+              <a:rPr lang="fr-FR" sz="1000" b="1" kern="0" dirty="0" smtClean="0">
+                <a:solidFill>
+                  <a:prstClr val="black"/>
+                </a:solidFill>
+                <a:latin typeface="Calibri"/>
+              </a:rPr>
+              <a:t>MEMORISER</a:t>
+            </a:r>
+          </a:p>
+          <a:p>
+            <a:pPr algn="ctr">
+              <a:defRPr/>
+            </a:pPr>
+            <a:r>
+              <a:rPr lang="fr-FR" sz="1100" kern="0" dirty="0" smtClean="0">
+                <a:solidFill>
+                  <a:prstClr val="black"/>
+                </a:solidFill>
+              </a:rPr>
+              <a:t>Automate télémécanique</a:t>
+            </a:r>
+          </a:p>
+          <a:p>
+            <a:pPr marL="0" marR="0" lvl="0" indent="0" algn="ctr" defTabSz="914400" eaLnBrk="1" fontAlgn="auto" latinLnBrk="0" hangingPunct="1">
+              <a:lnSpc>
+                <a:spcPct val="100000"/>
+              </a:lnSpc>
+              <a:spcBef>
+                <a:spcPts val="0"/>
+              </a:spcBef>
+              <a:spcAft>
+                <a:spcPts val="0"/>
+              </a:spcAft>
+              <a:buClrTx/>
+              <a:buSzTx/>
+              <a:buFontTx/>
+              <a:buNone/>
+              <a:tabLst/>
+              <a:defRPr/>
+            </a:pPr>
+            <a:endParaRPr kumimoji="0" lang="fr-FR" sz="1000" b="1" i="0" u="none" strike="noStrike" kern="0" cap="none" spc="0" normalizeH="0" baseline="0" noProof="0" dirty="0" smtClean="0">
+              <a:ln>
+                <a:noFill/>
+              </a:ln>
+              <a:solidFill>
+                <a:prstClr val="black"/>
+              </a:solidFill>
+              <a:effectLst/>
+              <a:uLnTx/>
+              <a:uFillTx/>
+              <a:latin typeface="Calibri"/>
+              <a:ea typeface="+mn-ea"/>
+              <a:cs typeface="+mn-cs"/>
+            </a:endParaRPr>
+          </a:p>
+        </p:txBody>
+      </p:sp>
+      <p:cxnSp>
+        <p:nvCxnSpPr>
+          <p:cNvPr id="76" name="Connecteur droit avec flèche 75"/>
+          <p:cNvCxnSpPr/>
+          <p:nvPr/>
+        </p:nvCxnSpPr>
+        <p:spPr>
+          <a:xfrm>
+            <a:off x="6357950" y="2495810"/>
+            <a:ext cx="765922" cy="0"/>
+          </a:xfrm>
+          <a:prstGeom prst="straightConnector1">
+            <a:avLst/>
+          </a:prstGeom>
+          <a:solidFill>
+            <a:schemeClr val="accent1">
+              <a:lumMod val="20000"/>
+              <a:lumOff val="80000"/>
+            </a:schemeClr>
+          </a:solidFill>
+          <a:ln w="28575" cap="flat" cmpd="sng" algn="ctr">
+            <a:solidFill>
+              <a:srgbClr val="4F81BD">
+                <a:shade val="95000"/>
+                <a:satMod val="105000"/>
+              </a:srgbClr>
+            </a:solidFill>
+            <a:prstDash val="solid"/>
+            <a:headEnd type="arrow"/>
+            <a:tailEnd type="arrow"/>
+          </a:ln>
+          <a:effectLst/>
+        </p:spPr>
+      </p:cxnSp>
+      <p:sp>
+        <p:nvSpPr>
+          <p:cNvPr id="78" name="ZoneTexte 77"/>
+          <p:cNvSpPr txBox="1"/>
+          <p:nvPr/>
+        </p:nvSpPr>
+        <p:spPr>
+          <a:xfrm>
+            <a:off x="7143768" y="2285992"/>
+            <a:ext cx="1857388" cy="646331"/>
+          </a:xfrm>
+          <a:prstGeom prst="rect">
+            <a:avLst/>
+          </a:prstGeom>
+          <a:noFill/>
+        </p:spPr>
+        <p:txBody>
+          <a:bodyPr wrap="square" rtlCol="0">
+            <a:spAutoFit/>
+          </a:bodyPr>
+          <a:lstStyle/>
+          <a:p>
+            <a:r>
+              <a:rPr lang="fr-FR" sz="1200" b="1" i="1" dirty="0" smtClean="0">
+                <a:solidFill>
+                  <a:schemeClr val="tx2"/>
+                </a:solidFill>
+              </a:rPr>
+              <a:t>Informations issues du système et venant de l’extérieur</a:t>
+            </a:r>
+            <a:endParaRPr lang="fr-FR" sz="1200" b="1" i="1" dirty="0">
+              <a:solidFill>
+                <a:schemeClr val="tx2"/>
+              </a:solidFill>
+            </a:endParaRPr>
+          </a:p>
+        </p:txBody>
+      </p:sp>
+      <p:cxnSp>
+        <p:nvCxnSpPr>
+          <p:cNvPr id="104" name="Connecteur droit 103"/>
+          <p:cNvCxnSpPr/>
+          <p:nvPr/>
+        </p:nvCxnSpPr>
+        <p:spPr>
+          <a:xfrm flipV="1">
+            <a:off x="1780058" y="5913921"/>
+            <a:ext cx="694931" cy="0"/>
+          </a:xfrm>
+          <a:prstGeom prst="line">
+            <a:avLst/>
+          </a:prstGeom>
+          <a:noFill/>
+          <a:ln w="28575" cap="flat" cmpd="sng" algn="ctr">
+            <a:solidFill>
+              <a:srgbClr val="C0504D">
+                <a:shade val="95000"/>
+                <a:satMod val="105000"/>
+              </a:srgbClr>
+            </a:solidFill>
+            <a:prstDash val="solid"/>
+            <a:headEnd type="none" w="med" len="med"/>
+            <a:tailEnd type="arrow" w="med" len="med"/>
+          </a:ln>
+          <a:effectLst/>
+        </p:spPr>
+      </p:cxnSp>
+      <p:cxnSp>
+        <p:nvCxnSpPr>
+          <p:cNvPr id="105" name="Connecteur droit avec flèche 104"/>
+          <p:cNvCxnSpPr/>
+          <p:nvPr/>
+        </p:nvCxnSpPr>
+        <p:spPr>
+          <a:xfrm>
+            <a:off x="1780058" y="6201953"/>
+            <a:ext cx="720240" cy="0"/>
+          </a:xfrm>
+          <a:prstGeom prst="straightConnector1">
+            <a:avLst/>
+          </a:prstGeom>
+          <a:noFill/>
+          <a:ln w="28575" cap="flat" cmpd="sng" algn="ctr">
+            <a:solidFill>
+              <a:srgbClr val="4F81BD">
+                <a:shade val="95000"/>
+                <a:satMod val="105000"/>
+              </a:srgbClr>
+            </a:solidFill>
+            <a:prstDash val="solid"/>
+            <a:tailEnd type="arrow"/>
+          </a:ln>
+          <a:effectLst/>
+        </p:spPr>
+      </p:cxnSp>
+      <p:sp>
+        <p:nvSpPr>
+          <p:cNvPr id="106" name="ZoneTexte 105"/>
+          <p:cNvSpPr txBox="1"/>
+          <p:nvPr/>
+        </p:nvSpPr>
+        <p:spPr>
+          <a:xfrm>
+            <a:off x="2500298" y="6063453"/>
+            <a:ext cx="1370667" cy="276999"/>
+          </a:xfrm>
+          <a:prstGeom prst="rect">
+            <a:avLst/>
+          </a:prstGeom>
+          <a:noFill/>
+        </p:spPr>
+        <p:txBody>
+          <a:bodyPr wrap="square" rtlCol="0">
+            <a:spAutoFit/>
+          </a:bodyPr>
+          <a:lstStyle/>
+          <a:p>
+            <a:r>
+              <a:rPr lang="fr-FR" sz="1200" b="1" i="1" dirty="0" smtClean="0">
+                <a:solidFill>
+                  <a:schemeClr val="tx2"/>
+                </a:solidFill>
+              </a:rPr>
+              <a:t>Lien d’information</a:t>
+            </a:r>
+            <a:endParaRPr lang="fr-FR" sz="1200" b="1" i="1" dirty="0">
+              <a:solidFill>
+                <a:schemeClr val="tx2"/>
+              </a:solidFill>
+            </a:endParaRPr>
+          </a:p>
+        </p:txBody>
+      </p:sp>
+      <p:sp>
+        <p:nvSpPr>
+          <p:cNvPr id="107" name="Rectangle 106"/>
+          <p:cNvSpPr/>
+          <p:nvPr/>
+        </p:nvSpPr>
+        <p:spPr>
+          <a:xfrm>
+            <a:off x="2500298" y="5786454"/>
+            <a:ext cx="1077218" cy="276999"/>
+          </a:xfrm>
+          <a:prstGeom prst="rect">
+            <a:avLst/>
+          </a:prstGeom>
+        </p:spPr>
+        <p:txBody>
+          <a:bodyPr wrap="none">
+            <a:spAutoFit/>
+          </a:bodyPr>
+          <a:lstStyle/>
+          <a:p>
+            <a:r>
+              <a:rPr lang="fr-FR" sz="1200" b="1" i="1" dirty="0" smtClean="0">
+                <a:solidFill>
+                  <a:schemeClr val="accent2"/>
+                </a:solidFill>
+              </a:rPr>
+              <a:t>Lien d’énergie</a:t>
+            </a:r>
+            <a:endParaRPr lang="fr-FR" sz="1200" b="1" i="1" dirty="0">
+              <a:solidFill>
+                <a:schemeClr val="accent2"/>
+              </a:solidFill>
+            </a:endParaRPr>
+          </a:p>
+        </p:txBody>
+      </p:sp>
+      <p:sp>
+        <p:nvSpPr>
+          <p:cNvPr id="110" name="Rectangle 109"/>
+          <p:cNvSpPr/>
+          <p:nvPr/>
+        </p:nvSpPr>
+        <p:spPr>
+          <a:xfrm>
+            <a:off x="714348" y="2214554"/>
+            <a:ext cx="1440000" cy="576000"/>
+          </a:xfrm>
+          <a:prstGeom prst="rect">
+            <a:avLst/>
+          </a:prstGeom>
+          <a:solidFill>
+            <a:schemeClr val="tx2">
+              <a:lumMod val="40000"/>
+              <a:lumOff val="60000"/>
+            </a:schemeClr>
+          </a:solidFill>
+          <a:ln w="9525" cap="flat" cmpd="sng" algn="ctr">
+            <a:solidFill>
+              <a:srgbClr val="4F81BD">
+                <a:shade val="95000"/>
+                <a:satMod val="105000"/>
+              </a:srgbClr>
+            </a:solidFill>
+            <a:prstDash val="solid"/>
+          </a:ln>
+          <a:effectLst>
+            <a:outerShdw blurRad="40000" dist="20000" dir="5400000" rotWithShape="0">
+              <a:srgbClr val="000000">
+                <a:alpha val="38000"/>
+              </a:srgbClr>
+            </a:outerShdw>
+          </a:effectLst>
+        </p:spPr>
+        <p:txBody>
+          <a:bodyPr rtlCol="0" anchor="t"/>
+          <a:lstStyle/>
+          <a:p>
+            <a:pPr marL="0" marR="0" lvl="0" indent="0" algn="ctr" defTabSz="914400" eaLnBrk="1" fontAlgn="auto" latinLnBrk="0" hangingPunct="1">
+              <a:lnSpc>
+                <a:spcPct val="100000"/>
+              </a:lnSpc>
+              <a:spcBef>
+                <a:spcPts val="0"/>
+              </a:spcBef>
+              <a:spcAft>
+                <a:spcPts val="0"/>
+              </a:spcAft>
+              <a:buClrTx/>
+              <a:buSzTx/>
+              <a:buFontTx/>
+              <a:buNone/>
+              <a:tabLst/>
+              <a:defRPr/>
+            </a:pPr>
+            <a:r>
+              <a:rPr kumimoji="0" lang="fr-FR" sz="1200" b="1" i="0" u="none" strike="noStrike" kern="0" cap="none" spc="0" normalizeH="0" baseline="0" noProof="0" dirty="0" smtClean="0">
+                <a:ln>
+                  <a:noFill/>
+                </a:ln>
+                <a:solidFill>
+                  <a:prstClr val="black"/>
+                </a:solidFill>
+                <a:effectLst/>
+                <a:uLnTx/>
+                <a:uFillTx/>
+                <a:latin typeface="Calibri"/>
+                <a:ea typeface="+mn-ea"/>
+                <a:cs typeface="+mn-cs"/>
+              </a:rPr>
+              <a:t>ACQUERIR</a:t>
+            </a:r>
+          </a:p>
+          <a:p>
+            <a:pPr marL="0" marR="0" lvl="0" indent="0" algn="ctr" defTabSz="914400" eaLnBrk="1" fontAlgn="auto" latinLnBrk="0" hangingPunct="1">
+              <a:lnSpc>
+                <a:spcPct val="100000"/>
+              </a:lnSpc>
+              <a:spcBef>
+                <a:spcPts val="0"/>
+              </a:spcBef>
+              <a:spcAft>
+                <a:spcPts val="0"/>
+              </a:spcAft>
+              <a:buClrTx/>
+              <a:buSzTx/>
+              <a:buFontTx/>
+              <a:buNone/>
+              <a:tabLst/>
+              <a:defRPr/>
+            </a:pPr>
+            <a:r>
+              <a:rPr kumimoji="0" lang="fr-FR" sz="1200" i="0" u="none" strike="noStrike" kern="0" cap="none" spc="0" normalizeH="0" baseline="0" noProof="0" dirty="0" smtClean="0">
+                <a:ln>
+                  <a:noFill/>
+                </a:ln>
+                <a:solidFill>
+                  <a:prstClr val="black"/>
+                </a:solidFill>
+                <a:effectLst/>
+                <a:uLnTx/>
+                <a:uFillTx/>
+                <a:latin typeface="Calibri"/>
+                <a:ea typeface="+mn-ea"/>
+                <a:cs typeface="+mn-cs"/>
+              </a:rPr>
+              <a:t>Détecteurs</a:t>
+            </a:r>
+            <a:r>
+              <a:rPr kumimoji="0" lang="fr-FR" sz="1200" i="0" u="none" strike="noStrike" kern="0" cap="none" spc="0" normalizeH="0" noProof="0" dirty="0" smtClean="0">
+                <a:ln>
+                  <a:noFill/>
+                </a:ln>
+                <a:solidFill>
+                  <a:prstClr val="black"/>
+                </a:solidFill>
+                <a:effectLst/>
+                <a:uLnTx/>
+                <a:uFillTx/>
+                <a:latin typeface="Calibri"/>
+                <a:ea typeface="+mn-ea"/>
+                <a:cs typeface="+mn-cs"/>
+              </a:rPr>
+              <a:t> fin de course</a:t>
+            </a:r>
+            <a:endParaRPr lang="fr-FR" sz="1000" kern="0" dirty="0" smtClean="0">
+              <a:solidFill>
+                <a:prstClr val="black"/>
+              </a:solidFill>
+            </a:endParaRPr>
+          </a:p>
+          <a:p>
+            <a:pPr marL="0" marR="0" lvl="0" indent="0" algn="ctr" defTabSz="914400" eaLnBrk="1" fontAlgn="auto" latinLnBrk="0" hangingPunct="1">
+              <a:lnSpc>
+                <a:spcPct val="100000"/>
+              </a:lnSpc>
+              <a:spcBef>
+                <a:spcPts val="0"/>
+              </a:spcBef>
+              <a:spcAft>
+                <a:spcPts val="0"/>
+              </a:spcAft>
+              <a:buClrTx/>
+              <a:buSzTx/>
+              <a:buFontTx/>
+              <a:buNone/>
+              <a:tabLst/>
+              <a:defRPr/>
+            </a:pPr>
+            <a:endParaRPr kumimoji="0" lang="fr-FR" sz="1200" i="0" u="none" strike="noStrike" kern="0" cap="none" spc="0" normalizeH="0" noProof="0" dirty="0" smtClean="0">
+              <a:ln>
+                <a:noFill/>
+              </a:ln>
+              <a:solidFill>
+                <a:prstClr val="black"/>
+              </a:solidFill>
+              <a:effectLst/>
+              <a:uLnTx/>
+              <a:uFillTx/>
+              <a:latin typeface="Calibri"/>
+              <a:ea typeface="+mn-ea"/>
+              <a:cs typeface="+mn-cs"/>
+            </a:endParaRPr>
+          </a:p>
+          <a:p>
+            <a:pPr marL="0" marR="0" lvl="0" indent="0" algn="ctr" defTabSz="914400" eaLnBrk="1" fontAlgn="auto" latinLnBrk="0" hangingPunct="1">
+              <a:lnSpc>
+                <a:spcPct val="100000"/>
+              </a:lnSpc>
+              <a:spcBef>
+                <a:spcPts val="0"/>
+              </a:spcBef>
+              <a:spcAft>
+                <a:spcPts val="0"/>
+              </a:spcAft>
+              <a:buClrTx/>
+              <a:buSzTx/>
+              <a:buFontTx/>
+              <a:buNone/>
+              <a:tabLst/>
+              <a:defRPr/>
+            </a:pPr>
+            <a:endParaRPr kumimoji="0" lang="fr-FR" sz="1050" i="0" u="none" strike="noStrike" kern="0" cap="none" spc="0" normalizeH="0" baseline="0" noProof="0" dirty="0" smtClean="0">
+              <a:ln>
+                <a:noFill/>
+              </a:ln>
+              <a:solidFill>
+                <a:prstClr val="black"/>
+              </a:solidFill>
+              <a:effectLst/>
+              <a:uLnTx/>
+              <a:uFillTx/>
+              <a:latin typeface="Calibri"/>
+              <a:ea typeface="+mn-ea"/>
+              <a:cs typeface="+mn-cs"/>
+            </a:endParaRPr>
+          </a:p>
+        </p:txBody>
+      </p:sp>
+      <p:cxnSp>
+        <p:nvCxnSpPr>
+          <p:cNvPr id="114" name="Connecteur droit avec flèche 113"/>
+          <p:cNvCxnSpPr>
+            <a:stCxn id="110" idx="3"/>
+            <a:endCxn id="65" idx="1"/>
+          </p:cNvCxnSpPr>
+          <p:nvPr/>
+        </p:nvCxnSpPr>
+        <p:spPr>
+          <a:xfrm>
+            <a:off x="2154348" y="2502554"/>
+            <a:ext cx="560264" cy="1588"/>
+          </a:xfrm>
+          <a:prstGeom prst="straightConnector1">
+            <a:avLst/>
+          </a:prstGeom>
+          <a:noFill/>
+          <a:ln w="28575" cap="flat" cmpd="sng" algn="ctr">
+            <a:solidFill>
+              <a:srgbClr val="4F81BD">
+                <a:shade val="95000"/>
+                <a:satMod val="105000"/>
+              </a:srgbClr>
+            </a:solidFill>
+            <a:prstDash val="solid"/>
+            <a:tailEnd type="arrow"/>
+          </a:ln>
+          <a:effectLst/>
+        </p:spPr>
+      </p:cxnSp>
+      <p:sp>
+        <p:nvSpPr>
+          <p:cNvPr id="140" name="Rectangle 139"/>
+          <p:cNvSpPr/>
+          <p:nvPr/>
+        </p:nvSpPr>
+        <p:spPr>
+          <a:xfrm>
+            <a:off x="4929190" y="2210058"/>
+            <a:ext cx="1440000" cy="576000"/>
+          </a:xfrm>
+          <a:prstGeom prst="rect">
+            <a:avLst/>
+          </a:prstGeom>
+          <a:solidFill>
+            <a:schemeClr val="tx2">
+              <a:lumMod val="40000"/>
+              <a:lumOff val="60000"/>
+            </a:schemeClr>
+          </a:solidFill>
+          <a:ln w="9525" cap="flat" cmpd="sng" algn="ctr">
+            <a:solidFill>
+              <a:srgbClr val="4F81BD">
+                <a:shade val="95000"/>
+                <a:satMod val="105000"/>
+              </a:srgbClr>
+            </a:solidFill>
+            <a:prstDash val="solid"/>
+          </a:ln>
+          <a:effectLst>
+            <a:outerShdw blurRad="40000" dist="20000" dir="5400000" rotWithShape="0">
+              <a:srgbClr val="000000">
+                <a:alpha val="38000"/>
+              </a:srgbClr>
+            </a:outerShdw>
+          </a:effectLst>
+        </p:spPr>
+        <p:txBody>
+          <a:bodyPr rtlCol="0" anchor="t"/>
+          <a:lstStyle/>
+          <a:p>
+            <a:pPr algn="ctr">
+              <a:defRPr/>
+            </a:pPr>
+            <a:r>
+              <a:rPr lang="fr-FR" sz="1200" b="1" kern="0" dirty="0" smtClean="0">
+                <a:solidFill>
+                  <a:prstClr val="black"/>
+                </a:solidFill>
+                <a:latin typeface="Calibri"/>
+              </a:rPr>
+              <a:t>COMMUNIQUER</a:t>
+            </a:r>
+          </a:p>
+          <a:p>
+            <a:pPr algn="ctr">
+              <a:defRPr/>
+            </a:pPr>
+            <a:r>
+              <a:rPr lang="fr-FR" sz="1200" kern="0" dirty="0" smtClean="0">
+                <a:solidFill>
+                  <a:prstClr val="black"/>
+                </a:solidFill>
+                <a:latin typeface="Calibri"/>
+              </a:rPr>
+              <a:t>Pupitres</a:t>
+            </a:r>
+          </a:p>
+        </p:txBody>
+      </p:sp>
+      <p:sp>
+        <p:nvSpPr>
+          <p:cNvPr id="162" name="Rectangle 161"/>
+          <p:cNvSpPr/>
+          <p:nvPr/>
+        </p:nvSpPr>
+        <p:spPr>
+          <a:xfrm>
+            <a:off x="488794" y="4714884"/>
+            <a:ext cx="1440000" cy="576000"/>
+          </a:xfrm>
+          <a:prstGeom prst="rect">
+            <a:avLst/>
+          </a:prstGeom>
+          <a:solidFill>
+            <a:schemeClr val="accent2">
+              <a:lumMod val="40000"/>
+              <a:lumOff val="60000"/>
+            </a:schemeClr>
+          </a:solidFill>
+          <a:ln w="9525" cap="flat" cmpd="sng" algn="ctr">
+            <a:solidFill>
+              <a:srgbClr val="C0504D">
+                <a:shade val="95000"/>
+                <a:satMod val="105000"/>
+              </a:srgbClr>
+            </a:solidFill>
+            <a:prstDash val="solid"/>
+          </a:ln>
+          <a:effectLst>
+            <a:outerShdw blurRad="40000" dist="20000" dir="5400000" rotWithShape="0">
+              <a:srgbClr val="000000">
+                <a:alpha val="38000"/>
+              </a:srgbClr>
+            </a:outerShdw>
+          </a:effectLst>
+        </p:spPr>
+        <p:txBody>
+          <a:bodyPr rtlCol="0" anchor="t"/>
+          <a:lstStyle/>
+          <a:p>
+            <a:pPr algn="ctr">
+              <a:defRPr/>
+            </a:pPr>
+            <a:r>
+              <a:rPr lang="fr-FR" sz="1200" b="1" kern="0" dirty="0" smtClean="0">
+                <a:solidFill>
+                  <a:prstClr val="black"/>
+                </a:solidFill>
+                <a:latin typeface="Calibri"/>
+              </a:rPr>
+              <a:t>TRANSMETTRE</a:t>
+            </a:r>
+          </a:p>
+          <a:p>
+            <a:pPr algn="ctr">
+              <a:defRPr/>
+            </a:pPr>
+            <a:r>
+              <a:rPr lang="fr-FR" sz="1200" kern="0" dirty="0" smtClean="0">
+                <a:solidFill>
+                  <a:prstClr val="black"/>
+                </a:solidFill>
+              </a:rPr>
+              <a:t>Réducteur roue et vis sans fin</a:t>
+            </a:r>
+          </a:p>
+          <a:p>
+            <a:pPr algn="ctr">
+              <a:defRPr/>
+            </a:pPr>
+            <a:endParaRPr lang="fr-FR" sz="1200" kern="0" dirty="0" smtClean="0">
+              <a:solidFill>
+                <a:prstClr val="black"/>
+              </a:solidFill>
+            </a:endParaRPr>
+          </a:p>
+        </p:txBody>
+      </p:sp>
+      <p:cxnSp>
+        <p:nvCxnSpPr>
+          <p:cNvPr id="170" name="Connecteur droit 169"/>
+          <p:cNvCxnSpPr/>
+          <p:nvPr/>
+        </p:nvCxnSpPr>
+        <p:spPr>
+          <a:xfrm>
+            <a:off x="3703504" y="4071942"/>
+            <a:ext cx="345950" cy="1588"/>
+          </a:xfrm>
+          <a:prstGeom prst="line">
+            <a:avLst/>
+          </a:prstGeom>
+          <a:noFill/>
+          <a:ln w="28575" cap="flat" cmpd="sng" algn="ctr">
+            <a:solidFill>
+              <a:srgbClr val="C0504D">
+                <a:shade val="95000"/>
+                <a:satMod val="105000"/>
+              </a:srgbClr>
+            </a:solidFill>
+            <a:prstDash val="solid"/>
+            <a:headEnd type="none" w="med" len="med"/>
+            <a:tailEnd type="arrow" w="med" len="med"/>
+          </a:ln>
+          <a:effectLst/>
+        </p:spPr>
+      </p:cxnSp>
+      <p:cxnSp>
+        <p:nvCxnSpPr>
+          <p:cNvPr id="181" name="Connecteur droit 180"/>
+          <p:cNvCxnSpPr/>
+          <p:nvPr/>
+        </p:nvCxnSpPr>
+        <p:spPr>
+          <a:xfrm rot="5400000">
+            <a:off x="1089603" y="4602901"/>
+            <a:ext cx="215902" cy="11240"/>
+          </a:xfrm>
+          <a:prstGeom prst="line">
+            <a:avLst/>
+          </a:prstGeom>
+          <a:noFill/>
+          <a:ln w="28575" cap="flat" cmpd="sng" algn="ctr">
+            <a:solidFill>
+              <a:srgbClr val="C0504D">
+                <a:shade val="95000"/>
+                <a:satMod val="105000"/>
+              </a:srgbClr>
+            </a:solidFill>
+            <a:prstDash val="solid"/>
+            <a:headEnd type="none" w="med" len="med"/>
+            <a:tailEnd type="arrow" w="med" len="med"/>
+          </a:ln>
+          <a:effectLst/>
+        </p:spPr>
+      </p:cxnSp>
+      <p:cxnSp>
+        <p:nvCxnSpPr>
+          <p:cNvPr id="183" name="Connecteur droit 182"/>
+          <p:cNvCxnSpPr/>
+          <p:nvPr/>
+        </p:nvCxnSpPr>
+        <p:spPr>
+          <a:xfrm>
+            <a:off x="1203174" y="4500570"/>
+            <a:ext cx="3571900" cy="1588"/>
+          </a:xfrm>
+          <a:prstGeom prst="line">
+            <a:avLst/>
+          </a:prstGeom>
+          <a:noFill/>
+          <a:ln w="28575" cap="flat" cmpd="sng" algn="ctr">
+            <a:solidFill>
+              <a:srgbClr val="C0504D">
+                <a:shade val="95000"/>
+                <a:satMod val="105000"/>
+              </a:srgbClr>
+            </a:solidFill>
+            <a:prstDash val="solid"/>
+            <a:headEnd type="none" w="med" len="med"/>
+            <a:tailEnd type="none" w="med" len="med"/>
+          </a:ln>
+          <a:effectLst/>
+        </p:spPr>
+      </p:cxnSp>
+      <p:cxnSp>
+        <p:nvCxnSpPr>
+          <p:cNvPr id="186" name="Connecteur droit 185"/>
+          <p:cNvCxnSpPr>
+            <a:endCxn id="57" idx="2"/>
+          </p:cNvCxnSpPr>
+          <p:nvPr/>
+        </p:nvCxnSpPr>
+        <p:spPr>
+          <a:xfrm rot="5400000" flipH="1" flipV="1">
+            <a:off x="4708694" y="4428570"/>
+            <a:ext cx="138380" cy="5620"/>
+          </a:xfrm>
+          <a:prstGeom prst="line">
+            <a:avLst/>
+          </a:prstGeom>
+          <a:noFill/>
+          <a:ln w="28575" cap="flat" cmpd="sng" algn="ctr">
+            <a:solidFill>
+              <a:srgbClr val="C0504D">
+                <a:shade val="95000"/>
+                <a:satMod val="105000"/>
+              </a:srgbClr>
+            </a:solidFill>
+            <a:prstDash val="solid"/>
+            <a:headEnd type="none" w="med" len="med"/>
+            <a:tailEnd type="none" w="med" len="med"/>
+          </a:ln>
+          <a:effectLst/>
+        </p:spPr>
+      </p:cxnSp>
+      <p:cxnSp>
+        <p:nvCxnSpPr>
+          <p:cNvPr id="189" name="Connecteur droit 188"/>
+          <p:cNvCxnSpPr>
+            <a:stCxn id="162" idx="3"/>
+          </p:cNvCxnSpPr>
+          <p:nvPr/>
+        </p:nvCxnSpPr>
+        <p:spPr>
+          <a:xfrm flipV="1">
+            <a:off x="1928794" y="5002224"/>
+            <a:ext cx="4071966" cy="660"/>
+          </a:xfrm>
+          <a:prstGeom prst="line">
+            <a:avLst/>
+          </a:prstGeom>
+          <a:noFill/>
+          <a:ln w="28575" cap="flat" cmpd="sng" algn="ctr">
+            <a:solidFill>
+              <a:srgbClr val="C0504D">
+                <a:shade val="95000"/>
+                <a:satMod val="105000"/>
+              </a:srgbClr>
+            </a:solidFill>
+            <a:prstDash val="solid"/>
+            <a:headEnd type="none" w="med" len="med"/>
+            <a:tailEnd type="arrow" w="med" len="med"/>
+          </a:ln>
+          <a:effectLst/>
+        </p:spPr>
+      </p:cxnSp>
+      <p:cxnSp>
+        <p:nvCxnSpPr>
+          <p:cNvPr id="202" name="Connecteur droit 201"/>
+          <p:cNvCxnSpPr>
+            <a:endCxn id="42" idx="1"/>
+          </p:cNvCxnSpPr>
+          <p:nvPr/>
+        </p:nvCxnSpPr>
+        <p:spPr>
+          <a:xfrm>
+            <a:off x="-285784" y="4071942"/>
+            <a:ext cx="785818" cy="2248"/>
+          </a:xfrm>
+          <a:prstGeom prst="line">
+            <a:avLst/>
+          </a:prstGeom>
+          <a:noFill/>
+          <a:ln w="28575" cap="flat" cmpd="sng" algn="ctr">
+            <a:solidFill>
+              <a:srgbClr val="C0504D">
+                <a:shade val="95000"/>
+                <a:satMod val="105000"/>
+              </a:srgbClr>
+            </a:solidFill>
+            <a:prstDash val="solid"/>
+            <a:headEnd type="none" w="med" len="med"/>
+            <a:tailEnd type="arrow" w="med" len="med"/>
+          </a:ln>
+          <a:effectLst/>
+        </p:spPr>
+      </p:cxnSp>
+      <p:sp>
+        <p:nvSpPr>
+          <p:cNvPr id="205" name="Flèche vers le bas 204"/>
+          <p:cNvSpPr/>
+          <p:nvPr/>
+        </p:nvSpPr>
+        <p:spPr>
+          <a:xfrm>
+            <a:off x="6429388" y="3071810"/>
+            <a:ext cx="285752" cy="928694"/>
+          </a:xfrm>
+          <a:prstGeom prst="downArrow">
+            <a:avLst/>
+          </a:prstGeom>
+        </p:spPr>
+        <p:style>
+          <a:lnRef idx="1">
+            <a:schemeClr val="accent2"/>
+          </a:lnRef>
+          <a:fillRef idx="2">
+            <a:schemeClr val="accent2"/>
+          </a:fillRef>
+          <a:effectRef idx="1">
+            <a:schemeClr val="accent2"/>
+          </a:effectRef>
+          <a:fontRef idx="minor">
+            <a:schemeClr val="dk1"/>
+          </a:fontRef>
+        </p:style>
+        <p:txBody>
+          <a:bodyPr rtlCol="0" anchor="ctr"/>
+          <a:lstStyle/>
+          <a:p>
+            <a:pPr algn="ctr"/>
+            <a:endParaRPr lang="fr-FR"/>
+          </a:p>
+        </p:txBody>
+      </p:sp>
+      <p:sp>
+        <p:nvSpPr>
+          <p:cNvPr id="207" name="Flèche vers le bas 206"/>
+          <p:cNvSpPr/>
+          <p:nvPr/>
+        </p:nvSpPr>
+        <p:spPr>
+          <a:xfrm>
+            <a:off x="6429388" y="5429264"/>
+            <a:ext cx="285752" cy="642942"/>
+          </a:xfrm>
+          <a:prstGeom prst="downArrow">
+            <a:avLst/>
+          </a:prstGeom>
+        </p:spPr>
+        <p:style>
+          <a:lnRef idx="1">
+            <a:schemeClr val="accent2"/>
+          </a:lnRef>
+          <a:fillRef idx="2">
+            <a:schemeClr val="accent2"/>
+          </a:fillRef>
+          <a:effectRef idx="1">
+            <a:schemeClr val="accent2"/>
+          </a:effectRef>
+          <a:fontRef idx="minor">
+            <a:schemeClr val="dk1"/>
+          </a:fontRef>
+        </p:style>
+        <p:txBody>
+          <a:bodyPr rtlCol="0" anchor="ctr"/>
+          <a:lstStyle/>
+          <a:p>
+            <a:pPr algn="ctr"/>
+            <a:endParaRPr lang="fr-FR"/>
+          </a:p>
+        </p:txBody>
+      </p:sp>
+      <p:sp>
+        <p:nvSpPr>
+          <p:cNvPr id="208" name="Rectangle 207"/>
+          <p:cNvSpPr/>
+          <p:nvPr/>
+        </p:nvSpPr>
+        <p:spPr>
+          <a:xfrm>
+            <a:off x="6643702" y="5643578"/>
             <a:ext cx="1459054" cy="307777"/>
           </a:xfrm>
           <a:prstGeom prst="rect">
@@ -7296,7 +9349,7 @@
 </p:sld>
 </file>
 
-<file path=ppt/slides/slide3.xml><?xml version="1.0" encoding="utf-8"?>
+<file path=ppt/slides/slide4.xml><?xml version="1.0" encoding="utf-8"?>
 <p:sld xmlns:a="http://schemas.openxmlformats.org/drawingml/2006/main" xmlns:r="http://schemas.openxmlformats.org/officeDocument/2006/relationships" xmlns:p="http://schemas.openxmlformats.org/presentationml/2006/main">
   <p:cSld>
     <p:spTree>
@@ -10844,7 +12897,7 @@
 </p:sld>
 </file>
 
-<file path=ppt/slides/slide4.xml><?xml version="1.0" encoding="utf-8"?>
+<file path=ppt/slides/slide5.xml><?xml version="1.0" encoding="utf-8"?>
 <p:sld xmlns:a="http://schemas.openxmlformats.org/drawingml/2006/main" xmlns:r="http://schemas.openxmlformats.org/officeDocument/2006/relationships" xmlns:p="http://schemas.openxmlformats.org/presentationml/2006/main">
   <p:cSld>
     <p:spTree>
@@ -10927,39 +12980,8 @@
                 <a:ea typeface="+mn-ea"/>
                 <a:cs typeface="+mn-cs"/>
               </a:rPr>
-              <a:t>Chaîne </a:t>
-            </a:r>
-            <a:r>
-              <a:rPr kumimoji="0" lang="fr-FR" sz="1400" b="0" i="1" u="none" strike="noStrike" kern="0" cap="none" spc="0" normalizeH="0" baseline="0" noProof="0" dirty="0" smtClean="0">
-                <a:ln>
-                  <a:noFill/>
-                </a:ln>
-                <a:solidFill>
-                  <a:prstClr val="black"/>
-                </a:solidFill>
-                <a:effectLst/>
-                <a:uLnTx/>
-                <a:uFillTx/>
-                <a:latin typeface="Calibri"/>
-                <a:ea typeface="+mn-ea"/>
-                <a:cs typeface="+mn-cs"/>
-              </a:rPr>
-              <a:t>d’énergie partielle</a:t>
-            </a:r>
-            <a:endParaRPr kumimoji="0" lang="fr-FR" sz="1400" b="0" i="1" u="none" strike="noStrike" kern="0" cap="none" spc="0" normalizeH="0" baseline="0" noProof="0" dirty="0" smtClean="0">
-              <a:ln>
-                <a:noFill/>
-              </a:ln>
-              <a:solidFill>
-                <a:prstClr val="black"/>
-              </a:solidFill>
-              <a:effectLst/>
-              <a:uLnTx/>
-              <a:uFillTx/>
-              <a:latin typeface="Calibri"/>
-              <a:ea typeface="+mn-ea"/>
-              <a:cs typeface="+mn-cs"/>
-            </a:endParaRPr>
+              <a:t>Chaîne d’énergie partielle</a:t>
+            </a:r>
           </a:p>
         </p:txBody>
       </p:sp>
@@ -11152,39 +13174,8 @@
                 <a:ea typeface="+mn-ea"/>
                 <a:cs typeface="+mn-cs"/>
               </a:rPr>
-              <a:t>Chaîne </a:t>
-            </a:r>
-            <a:r>
-              <a:rPr kumimoji="0" lang="fr-FR" sz="1400" b="0" i="1" u="none" strike="noStrike" kern="0" cap="none" spc="0" normalizeH="0" baseline="0" noProof="0" dirty="0" smtClean="0">
-                <a:ln>
-                  <a:noFill/>
-                </a:ln>
-                <a:solidFill>
-                  <a:prstClr val="black"/>
-                </a:solidFill>
-                <a:effectLst/>
-                <a:uLnTx/>
-                <a:uFillTx/>
-                <a:latin typeface="Calibri"/>
-                <a:ea typeface="+mn-ea"/>
-                <a:cs typeface="+mn-cs"/>
-              </a:rPr>
-              <a:t>d’information partielle</a:t>
-            </a:r>
-            <a:endParaRPr kumimoji="0" lang="fr-FR" sz="1400" b="0" i="1" u="none" strike="noStrike" kern="0" cap="none" spc="0" normalizeH="0" baseline="0" noProof="0" dirty="0" smtClean="0">
-              <a:ln>
-                <a:noFill/>
-              </a:ln>
-              <a:solidFill>
-                <a:prstClr val="black"/>
-              </a:solidFill>
-              <a:effectLst/>
-              <a:uLnTx/>
-              <a:uFillTx/>
-              <a:latin typeface="Calibri"/>
-              <a:ea typeface="+mn-ea"/>
-              <a:cs typeface="+mn-cs"/>
-            </a:endParaRPr>
+              <a:t>Chaîne d’information partielle</a:t>
+            </a:r>
           </a:p>
         </p:txBody>
       </p:sp>
@@ -12257,7 +14248,7 @@
 </p:sld>
 </file>
 
-<file path=ppt/slides/slide5.xml><?xml version="1.0" encoding="utf-8"?>
+<file path=ppt/slides/slide6.xml><?xml version="1.0" encoding="utf-8"?>
 <p:sld xmlns:a="http://schemas.openxmlformats.org/drawingml/2006/main" xmlns:r="http://schemas.openxmlformats.org/officeDocument/2006/relationships" xmlns:p="http://schemas.openxmlformats.org/presentationml/2006/main">
   <p:cSld>
     <p:spTree>
@@ -13308,7 +15299,7 @@
 </p:sld>
 </file>
 
-<file path=ppt/slides/slide6.xml><?xml version="1.0" encoding="utf-8"?>
+<file path=ppt/slides/slide7.xml><?xml version="1.0" encoding="utf-8"?>
 <p:sld xmlns:a="http://schemas.openxmlformats.org/drawingml/2006/main" xmlns:r="http://schemas.openxmlformats.org/officeDocument/2006/relationships" xmlns:p="http://schemas.openxmlformats.org/presentationml/2006/main">
   <p:cSld>
     <p:spTree>
@@ -14983,7 +16974,7 @@
 </p:sld>
 </file>
 
-<file path=ppt/slides/slide7.xml><?xml version="1.0" encoding="utf-8"?>
+<file path=ppt/slides/slide8.xml><?xml version="1.0" encoding="utf-8"?>
 <p:sld xmlns:a="http://schemas.openxmlformats.org/drawingml/2006/main" xmlns:r="http://schemas.openxmlformats.org/officeDocument/2006/relationships" xmlns:p="http://schemas.openxmlformats.org/presentationml/2006/main">
   <p:cSld>
     <p:spTree>

</xml_diff>